<commit_message>
chat + file_search ok
</commit_message>
<xml_diff>
--- a/docs/features.pptx
+++ b/docs/features.pptx
@@ -8,6 +8,7 @@
     <p:sldId id="256" r:id="rId2"/>
     <p:sldId id="257" r:id="rId3"/>
     <p:sldId id="258" r:id="rId4"/>
+    <p:sldId id="259" r:id="rId5"/>
   </p:sldIdLst>
   <p:sldSz cx="12192000" cy="6858000"/>
   <p:notesSz cx="6858000" cy="9144000"/>
@@ -106,7 +107,169 @@
       </a:defRPr>
     </a:lvl9pPr>
   </p:defaultTextStyle>
+  <p:extLst>
+    <p:ext uri="{EFAFB233-063F-42B5-8137-9DF3F51BA10A}">
+      <p15:sldGuideLst xmlns:p15="http://schemas.microsoft.com/office/powerpoint/2012/main"/>
+    </p:ext>
+  </p:extLst>
 </p:presentation>
+</file>
+
+<file path=ppt/revisionInfo.xml><?xml version="1.0" encoding="utf-8"?>
+<p1510:revInfo xmlns:a="http://schemas.openxmlformats.org/drawingml/2006/main" xmlns:r="http://schemas.openxmlformats.org/officeDocument/2006/relationships" xmlns:p1510="http://schemas.microsoft.com/office/powerpoint/2015/10/main">
+  <p1510:revLst>
+    <p1510:client id="{A27BCA89-8643-4CA3-8099-F5CF2C0E2EA9}" v="4" dt="2024-12-25T22:52:55.598"/>
+  </p1510:revLst>
+</p1510:revInfo>
+</file>
+
+<file path=ppt/changesInfos/changesInfo1.xml><?xml version="1.0" encoding="utf-8"?>
+<pc:chgInfo xmlns:a="http://schemas.openxmlformats.org/drawingml/2006/main" xmlns:r="http://schemas.openxmlformats.org/officeDocument/2006/relationships" xmlns:ac="http://schemas.microsoft.com/office/drawing/2013/main/command" xmlns:pc="http://schemas.microsoft.com/office/powerpoint/2013/main/command">
+  <pc:docChgLst>
+    <pc:chgData name="Willy STOPHE" userId="bfa348040ab50133" providerId="LiveId" clId="{A27BCA89-8643-4CA3-8099-F5CF2C0E2EA9}"/>
+    <pc:docChg chg="custSel addSld modSld">
+      <pc:chgData name="Willy STOPHE" userId="bfa348040ab50133" providerId="LiveId" clId="{A27BCA89-8643-4CA3-8099-F5CF2C0E2EA9}" dt="2024-12-25T22:53:51.997" v="69" actId="1076"/>
+      <pc:docMkLst>
+        <pc:docMk/>
+      </pc:docMkLst>
+      <pc:sldChg chg="addSp delSp modSp new mod">
+        <pc:chgData name="Willy STOPHE" userId="bfa348040ab50133" providerId="LiveId" clId="{A27BCA89-8643-4CA3-8099-F5CF2C0E2EA9}" dt="2024-12-25T22:53:51.997" v="69" actId="1076"/>
+        <pc:sldMkLst>
+          <pc:docMk/>
+          <pc:sldMk cId="2949732544" sldId="259"/>
+        </pc:sldMkLst>
+        <pc:spChg chg="del">
+          <ac:chgData name="Willy STOPHE" userId="bfa348040ab50133" providerId="LiveId" clId="{A27BCA89-8643-4CA3-8099-F5CF2C0E2EA9}" dt="2024-12-25T22:50:58.629" v="1" actId="478"/>
+          <ac:spMkLst>
+            <pc:docMk/>
+            <pc:sldMk cId="2949732544" sldId="259"/>
+            <ac:spMk id="2" creationId="{B424217F-1232-11F4-F8EC-5405B3449BBE}"/>
+          </ac:spMkLst>
+        </pc:spChg>
+        <pc:spChg chg="del">
+          <ac:chgData name="Willy STOPHE" userId="bfa348040ab50133" providerId="LiveId" clId="{A27BCA89-8643-4CA3-8099-F5CF2C0E2EA9}" dt="2024-12-25T22:50:58.629" v="1" actId="478"/>
+          <ac:spMkLst>
+            <pc:docMk/>
+            <pc:sldMk cId="2949732544" sldId="259"/>
+            <ac:spMk id="3" creationId="{B90A3610-A4A8-0E91-1BF9-242A5838362E}"/>
+          </ac:spMkLst>
+        </pc:spChg>
+        <pc:spChg chg="add mod">
+          <ac:chgData name="Willy STOPHE" userId="bfa348040ab50133" providerId="LiveId" clId="{A27BCA89-8643-4CA3-8099-F5CF2C0E2EA9}" dt="2024-12-25T22:52:29.987" v="51" actId="1076"/>
+          <ac:spMkLst>
+            <pc:docMk/>
+            <pc:sldMk cId="2949732544" sldId="259"/>
+            <ac:spMk id="8" creationId="{400F17AC-26F1-FEEF-33CB-A932DE971BE9}"/>
+          </ac:spMkLst>
+        </pc:spChg>
+        <pc:spChg chg="add mod">
+          <ac:chgData name="Willy STOPHE" userId="bfa348040ab50133" providerId="LiveId" clId="{A27BCA89-8643-4CA3-8099-F5CF2C0E2EA9}" dt="2024-12-25T22:52:29.987" v="51" actId="1076"/>
+          <ac:spMkLst>
+            <pc:docMk/>
+            <pc:sldMk cId="2949732544" sldId="259"/>
+            <ac:spMk id="10" creationId="{17FCBB2D-3716-7632-DE49-D7FA481DDE2D}"/>
+          </ac:spMkLst>
+        </pc:spChg>
+        <pc:spChg chg="add mod">
+          <ac:chgData name="Willy STOPHE" userId="bfa348040ab50133" providerId="LiveId" clId="{A27BCA89-8643-4CA3-8099-F5CF2C0E2EA9}" dt="2024-12-25T22:52:49.457" v="55" actId="1076"/>
+          <ac:spMkLst>
+            <pc:docMk/>
+            <pc:sldMk cId="2949732544" sldId="259"/>
+            <ac:spMk id="13" creationId="{E7E7C53F-9AC1-856A-D065-2970FDF44513}"/>
+          </ac:spMkLst>
+        </pc:spChg>
+        <pc:spChg chg="add mod">
+          <ac:chgData name="Willy STOPHE" userId="bfa348040ab50133" providerId="LiveId" clId="{A27BCA89-8643-4CA3-8099-F5CF2C0E2EA9}" dt="2024-12-25T22:52:29.987" v="51" actId="1076"/>
+          <ac:spMkLst>
+            <pc:docMk/>
+            <pc:sldMk cId="2949732544" sldId="259"/>
+            <ac:spMk id="14" creationId="{3DE7B357-E2A5-BC0B-4A97-B07481E7B0C6}"/>
+          </ac:spMkLst>
+        </pc:spChg>
+        <pc:spChg chg="add mod">
+          <ac:chgData name="Willy STOPHE" userId="bfa348040ab50133" providerId="LiveId" clId="{A27BCA89-8643-4CA3-8099-F5CF2C0E2EA9}" dt="2024-12-25T22:52:58.154" v="58" actId="20577"/>
+          <ac:spMkLst>
+            <pc:docMk/>
+            <pc:sldMk cId="2949732544" sldId="259"/>
+            <ac:spMk id="18" creationId="{570641F1-F265-6EB1-18D5-0BC6894E6317}"/>
+          </ac:spMkLst>
+        </pc:spChg>
+        <pc:spChg chg="add mod">
+          <ac:chgData name="Willy STOPHE" userId="bfa348040ab50133" providerId="LiveId" clId="{A27BCA89-8643-4CA3-8099-F5CF2C0E2EA9}" dt="2024-12-25T22:53:04.780" v="59"/>
+          <ac:spMkLst>
+            <pc:docMk/>
+            <pc:sldMk cId="2949732544" sldId="259"/>
+            <ac:spMk id="19" creationId="{EC8C1319-2AD9-33D6-F087-4C74E9C6C58B}"/>
+          </ac:spMkLst>
+        </pc:spChg>
+        <pc:picChg chg="add del mod">
+          <ac:chgData name="Willy STOPHE" userId="bfa348040ab50133" providerId="LiveId" clId="{A27BCA89-8643-4CA3-8099-F5CF2C0E2EA9}" dt="2024-12-25T22:52:45.746" v="53" actId="478"/>
+          <ac:picMkLst>
+            <pc:docMk/>
+            <pc:sldMk cId="2949732544" sldId="259"/>
+            <ac:picMk id="5" creationId="{6EA7F704-BDF6-FC52-5A1A-F8BCB4537768}"/>
+          </ac:picMkLst>
+        </pc:picChg>
+        <pc:picChg chg="add mod">
+          <ac:chgData name="Willy STOPHE" userId="bfa348040ab50133" providerId="LiveId" clId="{A27BCA89-8643-4CA3-8099-F5CF2C0E2EA9}" dt="2024-12-25T22:52:29.987" v="51" actId="1076"/>
+          <ac:picMkLst>
+            <pc:docMk/>
+            <pc:sldMk cId="2949732544" sldId="259"/>
+            <ac:picMk id="7" creationId="{3E9046CC-2CA1-201D-C3C2-B7E4C6406767}"/>
+          </ac:picMkLst>
+        </pc:picChg>
+        <pc:picChg chg="add mod">
+          <ac:chgData name="Willy STOPHE" userId="bfa348040ab50133" providerId="LiveId" clId="{A27BCA89-8643-4CA3-8099-F5CF2C0E2EA9}" dt="2024-12-25T22:53:51.997" v="69" actId="1076"/>
+          <ac:picMkLst>
+            <pc:docMk/>
+            <pc:sldMk cId="2949732544" sldId="259"/>
+            <ac:picMk id="12" creationId="{F5C6FFE1-8894-A0C4-B936-3FB119412C67}"/>
+          </ac:picMkLst>
+        </pc:picChg>
+        <pc:picChg chg="add mod">
+          <ac:chgData name="Willy STOPHE" userId="bfa348040ab50133" providerId="LiveId" clId="{A27BCA89-8643-4CA3-8099-F5CF2C0E2EA9}" dt="2024-12-25T22:52:46.937" v="54" actId="1076"/>
+          <ac:picMkLst>
+            <pc:docMk/>
+            <pc:sldMk cId="2949732544" sldId="259"/>
+            <ac:picMk id="16" creationId="{0904C041-4F52-D5A8-6B0E-D19C90CF779F}"/>
+          </ac:picMkLst>
+        </pc:picChg>
+        <pc:picChg chg="add del mod">
+          <ac:chgData name="Willy STOPHE" userId="bfa348040ab50133" providerId="LiveId" clId="{A27BCA89-8643-4CA3-8099-F5CF2C0E2EA9}" dt="2024-12-25T22:53:21.618" v="60" actId="478"/>
+          <ac:picMkLst>
+            <pc:docMk/>
+            <pc:sldMk cId="2949732544" sldId="259"/>
+            <ac:picMk id="17" creationId="{5717A7E8-C092-4C54-D15E-BB111CCCA8FD}"/>
+          </ac:picMkLst>
+        </pc:picChg>
+        <pc:picChg chg="add mod">
+          <ac:chgData name="Willy STOPHE" userId="bfa348040ab50133" providerId="LiveId" clId="{A27BCA89-8643-4CA3-8099-F5CF2C0E2EA9}" dt="2024-12-25T22:53:49.837" v="68" actId="1076"/>
+          <ac:picMkLst>
+            <pc:docMk/>
+            <pc:sldMk cId="2949732544" sldId="259"/>
+            <ac:picMk id="20" creationId="{9A8684C0-1D6E-170D-C280-D9A1C3D84ACB}"/>
+          </ac:picMkLst>
+        </pc:picChg>
+        <pc:picChg chg="add mod">
+          <ac:chgData name="Willy STOPHE" userId="bfa348040ab50133" providerId="LiveId" clId="{A27BCA89-8643-4CA3-8099-F5CF2C0E2EA9}" dt="2024-12-25T22:53:26.551" v="62" actId="1076"/>
+          <ac:picMkLst>
+            <pc:docMk/>
+            <pc:sldMk cId="2949732544" sldId="259"/>
+            <ac:picMk id="22" creationId="{19B33FAF-DA05-2D66-69D6-BDCCDF737DCF}"/>
+          </ac:picMkLst>
+        </pc:picChg>
+        <pc:cxnChg chg="add mod">
+          <ac:chgData name="Willy STOPHE" userId="bfa348040ab50133" providerId="LiveId" clId="{A27BCA89-8643-4CA3-8099-F5CF2C0E2EA9}" dt="2024-12-25T22:53:45.380" v="67" actId="1035"/>
+          <ac:cxnSpMkLst>
+            <pc:docMk/>
+            <pc:sldMk cId="2949732544" sldId="259"/>
+            <ac:cxnSpMk id="24" creationId="{9BBB9227-AAC0-4C81-0532-27563D26589C}"/>
+          </ac:cxnSpMkLst>
+        </pc:cxnChg>
+      </pc:sldChg>
+    </pc:docChg>
+  </pc:docChgLst>
+</pc:chgInfo>
 </file>
 
 <file path=ppt/slideLayouts/slideLayout1.xml><?xml version="1.0" encoding="utf-8"?>
@@ -258,7 +421,7 @@
           <a:p>
             <a:fld id="{4A312362-86E4-4761-8656-F6268DCA2FD0}" type="datetimeFigureOut">
               <a:rPr lang="fr-FR" smtClean="0"/>
-              <a:t>24/12/2024</a:t>
+              <a:t>25/12/2024</a:t>
             </a:fld>
             <a:endParaRPr lang="fr-FR"/>
           </a:p>
@@ -458,7 +621,7 @@
           <a:p>
             <a:fld id="{4A312362-86E4-4761-8656-F6268DCA2FD0}" type="datetimeFigureOut">
               <a:rPr lang="fr-FR" smtClean="0"/>
-              <a:t>24/12/2024</a:t>
+              <a:t>25/12/2024</a:t>
             </a:fld>
             <a:endParaRPr lang="fr-FR"/>
           </a:p>
@@ -668,7 +831,7 @@
           <a:p>
             <a:fld id="{4A312362-86E4-4761-8656-F6268DCA2FD0}" type="datetimeFigureOut">
               <a:rPr lang="fr-FR" smtClean="0"/>
-              <a:t>24/12/2024</a:t>
+              <a:t>25/12/2024</a:t>
             </a:fld>
             <a:endParaRPr lang="fr-FR"/>
           </a:p>
@@ -868,7 +1031,7 @@
           <a:p>
             <a:fld id="{4A312362-86E4-4761-8656-F6268DCA2FD0}" type="datetimeFigureOut">
               <a:rPr lang="fr-FR" smtClean="0"/>
-              <a:t>24/12/2024</a:t>
+              <a:t>25/12/2024</a:t>
             </a:fld>
             <a:endParaRPr lang="fr-FR"/>
           </a:p>
@@ -1144,7 +1307,7 @@
           <a:p>
             <a:fld id="{4A312362-86E4-4761-8656-F6268DCA2FD0}" type="datetimeFigureOut">
               <a:rPr lang="fr-FR" smtClean="0"/>
-              <a:t>24/12/2024</a:t>
+              <a:t>25/12/2024</a:t>
             </a:fld>
             <a:endParaRPr lang="fr-FR"/>
           </a:p>
@@ -1412,7 +1575,7 @@
           <a:p>
             <a:fld id="{4A312362-86E4-4761-8656-F6268DCA2FD0}" type="datetimeFigureOut">
               <a:rPr lang="fr-FR" smtClean="0"/>
-              <a:t>24/12/2024</a:t>
+              <a:t>25/12/2024</a:t>
             </a:fld>
             <a:endParaRPr lang="fr-FR"/>
           </a:p>
@@ -1827,7 +1990,7 @@
           <a:p>
             <a:fld id="{4A312362-86E4-4761-8656-F6268DCA2FD0}" type="datetimeFigureOut">
               <a:rPr lang="fr-FR" smtClean="0"/>
-              <a:t>24/12/2024</a:t>
+              <a:t>25/12/2024</a:t>
             </a:fld>
             <a:endParaRPr lang="fr-FR"/>
           </a:p>
@@ -1969,7 +2132,7 @@
           <a:p>
             <a:fld id="{4A312362-86E4-4761-8656-F6268DCA2FD0}" type="datetimeFigureOut">
               <a:rPr lang="fr-FR" smtClean="0"/>
-              <a:t>24/12/2024</a:t>
+              <a:t>25/12/2024</a:t>
             </a:fld>
             <a:endParaRPr lang="fr-FR"/>
           </a:p>
@@ -2082,7 +2245,7 @@
           <a:p>
             <a:fld id="{4A312362-86E4-4761-8656-F6268DCA2FD0}" type="datetimeFigureOut">
               <a:rPr lang="fr-FR" smtClean="0"/>
-              <a:t>24/12/2024</a:t>
+              <a:t>25/12/2024</a:t>
             </a:fld>
             <a:endParaRPr lang="fr-FR"/>
           </a:p>
@@ -2395,7 +2558,7 @@
           <a:p>
             <a:fld id="{4A312362-86E4-4761-8656-F6268DCA2FD0}" type="datetimeFigureOut">
               <a:rPr lang="fr-FR" smtClean="0"/>
-              <a:t>24/12/2024</a:t>
+              <a:t>25/12/2024</a:t>
             </a:fld>
             <a:endParaRPr lang="fr-FR"/>
           </a:p>
@@ -2684,7 +2847,7 @@
           <a:p>
             <a:fld id="{4A312362-86E4-4761-8656-F6268DCA2FD0}" type="datetimeFigureOut">
               <a:rPr lang="fr-FR" smtClean="0"/>
-              <a:t>24/12/2024</a:t>
+              <a:t>25/12/2024</a:t>
             </a:fld>
             <a:endParaRPr lang="fr-FR"/>
           </a:p>
@@ -2927,7 +3090,7 @@
           <a:p>
             <a:fld id="{4A312362-86E4-4761-8656-F6268DCA2FD0}" type="datetimeFigureOut">
               <a:rPr lang="fr-FR" smtClean="0"/>
-              <a:t>24/12/2024</a:t>
+              <a:t>25/12/2024</a:t>
             </a:fld>
             <a:endParaRPr lang="fr-FR"/>
           </a:p>
@@ -5400,6 +5563,493 @@
     <p:extLst>
       <p:ext uri="{BB962C8B-B14F-4D97-AF65-F5344CB8AC3E}">
         <p14:creationId xmlns:p14="http://schemas.microsoft.com/office/powerpoint/2010/main" val="479488143"/>
+      </p:ext>
+    </p:extLst>
+  </p:cSld>
+  <p:clrMapOvr>
+    <a:masterClrMapping/>
+  </p:clrMapOvr>
+</p:sld>
+</file>
+
+<file path=ppt/slides/slide4.xml><?xml version="1.0" encoding="utf-8"?>
+<p:sld xmlns:a="http://schemas.openxmlformats.org/drawingml/2006/main" xmlns:r="http://schemas.openxmlformats.org/officeDocument/2006/relationships" xmlns:p="http://schemas.openxmlformats.org/presentationml/2006/main">
+  <p:cSld>
+    <p:spTree>
+      <p:nvGrpSpPr>
+        <p:cNvPr id="1" name=""/>
+        <p:cNvGrpSpPr/>
+        <p:nvPr/>
+      </p:nvGrpSpPr>
+      <p:grpSpPr>
+        <a:xfrm>
+          <a:off x="0" y="0"/>
+          <a:ext cx="0" cy="0"/>
+          <a:chOff x="0" y="0"/>
+          <a:chExt cx="0" cy="0"/>
+        </a:xfrm>
+      </p:grpSpPr>
+      <p:pic>
+        <p:nvPicPr>
+          <p:cNvPr id="7" name="Picture 6">
+            <a:extLst>
+              <a:ext uri="{FF2B5EF4-FFF2-40B4-BE49-F238E27FC236}">
+                <a16:creationId xmlns:a16="http://schemas.microsoft.com/office/drawing/2014/main" id="{3E9046CC-2CA1-201D-C3C2-B7E4C6406767}"/>
+              </a:ext>
+            </a:extLst>
+          </p:cNvPr>
+          <p:cNvPicPr>
+            <a:picLocks noChangeAspect="1"/>
+          </p:cNvPicPr>
+          <p:nvPr/>
+        </p:nvPicPr>
+        <p:blipFill>
+          <a:blip r:embed="rId2"/>
+          <a:stretch>
+            <a:fillRect/>
+          </a:stretch>
+        </p:blipFill>
+        <p:spPr>
+          <a:xfrm>
+            <a:off x="2219381" y="5105345"/>
+            <a:ext cx="3381375" cy="200025"/>
+          </a:xfrm>
+          <a:prstGeom prst="rect">
+            <a:avLst/>
+          </a:prstGeom>
+        </p:spPr>
+      </p:pic>
+      <p:sp>
+        <p:nvSpPr>
+          <p:cNvPr id="8" name="TextBox 7">
+            <a:extLst>
+              <a:ext uri="{FF2B5EF4-FFF2-40B4-BE49-F238E27FC236}">
+                <a16:creationId xmlns:a16="http://schemas.microsoft.com/office/drawing/2014/main" id="{400F17AC-26F1-FEEF-33CB-A932DE971BE9}"/>
+              </a:ext>
+            </a:extLst>
+          </p:cNvPr>
+          <p:cNvSpPr txBox="1"/>
+          <p:nvPr/>
+        </p:nvSpPr>
+        <p:spPr>
+          <a:xfrm>
+            <a:off x="1503942" y="4936038"/>
+            <a:ext cx="431528" cy="369332"/>
+          </a:xfrm>
+          <a:prstGeom prst="rect">
+            <a:avLst/>
+          </a:prstGeom>
+          <a:noFill/>
+        </p:spPr>
+        <p:txBody>
+          <a:bodyPr wrap="none" rtlCol="0">
+            <a:spAutoFit/>
+          </a:bodyPr>
+          <a:lstStyle/>
+          <a:p>
+            <a:r>
+              <a:rPr lang="fr-FR" dirty="0"/>
+              <a:t>#1</a:t>
+            </a:r>
+          </a:p>
+        </p:txBody>
+      </p:sp>
+      <p:sp>
+        <p:nvSpPr>
+          <p:cNvPr id="10" name="TextBox 9">
+            <a:extLst>
+              <a:ext uri="{FF2B5EF4-FFF2-40B4-BE49-F238E27FC236}">
+                <a16:creationId xmlns:a16="http://schemas.microsoft.com/office/drawing/2014/main" id="{17FCBB2D-3716-7632-DE49-D7FA481DDE2D}"/>
+              </a:ext>
+            </a:extLst>
+          </p:cNvPr>
+          <p:cNvSpPr txBox="1"/>
+          <p:nvPr/>
+        </p:nvSpPr>
+        <p:spPr>
+          <a:xfrm>
+            <a:off x="2130576" y="4828346"/>
+            <a:ext cx="6094206" cy="276999"/>
+          </a:xfrm>
+          <a:prstGeom prst="rect">
+            <a:avLst/>
+          </a:prstGeom>
+          <a:noFill/>
+        </p:spPr>
+        <p:txBody>
+          <a:bodyPr wrap="square">
+            <a:spAutoFit/>
+          </a:bodyPr>
+          <a:lstStyle/>
+          <a:p>
+            <a:r>
+              <a:rPr lang="en-US" sz="1200" b="1" i="0" dirty="0">
+                <a:solidFill>
+                  <a:srgbClr val="31333F"/>
+                </a:solidFill>
+                <a:effectLst/>
+                <a:latin typeface="Source Sans Pro" panose="020B0503030403020204" pitchFamily="34" charset="0"/>
+              </a:rPr>
+              <a:t>2024 Job </a:t>
+            </a:r>
+            <a:r>
+              <a:rPr lang="en-US" sz="1200" b="1" i="0" dirty="0" err="1">
+                <a:solidFill>
+                  <a:srgbClr val="31333F"/>
+                </a:solidFill>
+                <a:effectLst/>
+                <a:latin typeface="Source Sans Pro" panose="020B0503030403020204" pitchFamily="34" charset="0"/>
+              </a:rPr>
+              <a:t>Description_Chief</a:t>
+            </a:r>
+            <a:r>
+              <a:rPr lang="en-US" sz="1200" b="1" i="0" dirty="0">
+                <a:solidFill>
+                  <a:srgbClr val="31333F"/>
+                </a:solidFill>
+                <a:effectLst/>
+                <a:latin typeface="Source Sans Pro" panose="020B0503030403020204" pitchFamily="34" charset="0"/>
+              </a:rPr>
+              <a:t> Digital Experience Officer_R&amp;D-FORM-4-4.0-EN .docx</a:t>
+            </a:r>
+            <a:endParaRPr lang="fr-FR" sz="1200" dirty="0"/>
+          </a:p>
+        </p:txBody>
+      </p:sp>
+      <p:pic>
+        <p:nvPicPr>
+          <p:cNvPr id="12" name="Picture 11">
+            <a:extLst>
+              <a:ext uri="{FF2B5EF4-FFF2-40B4-BE49-F238E27FC236}">
+                <a16:creationId xmlns:a16="http://schemas.microsoft.com/office/drawing/2014/main" id="{F5C6FFE1-8894-A0C4-B936-3FB119412C67}"/>
+              </a:ext>
+            </a:extLst>
+          </p:cNvPr>
+          <p:cNvPicPr>
+            <a:picLocks noChangeAspect="1"/>
+          </p:cNvPicPr>
+          <p:nvPr/>
+        </p:nvPicPr>
+        <p:blipFill>
+          <a:blip r:embed="rId3"/>
+          <a:stretch>
+            <a:fillRect/>
+          </a:stretch>
+        </p:blipFill>
+        <p:spPr>
+          <a:xfrm>
+            <a:off x="9476299" y="4956105"/>
+            <a:ext cx="303875" cy="329198"/>
+          </a:xfrm>
+          <a:prstGeom prst="rect">
+            <a:avLst/>
+          </a:prstGeom>
+        </p:spPr>
+      </p:pic>
+      <p:sp>
+        <p:nvSpPr>
+          <p:cNvPr id="13" name="TextBox 12">
+            <a:extLst>
+              <a:ext uri="{FF2B5EF4-FFF2-40B4-BE49-F238E27FC236}">
+                <a16:creationId xmlns:a16="http://schemas.microsoft.com/office/drawing/2014/main" id="{E7E7C53F-9AC1-856A-D065-2970FDF44513}"/>
+              </a:ext>
+            </a:extLst>
+          </p:cNvPr>
+          <p:cNvSpPr txBox="1"/>
+          <p:nvPr/>
+        </p:nvSpPr>
+        <p:spPr>
+          <a:xfrm>
+            <a:off x="4795808" y="200416"/>
+            <a:ext cx="2392771" cy="369332"/>
+          </a:xfrm>
+          <a:prstGeom prst="rect">
+            <a:avLst/>
+          </a:prstGeom>
+          <a:noFill/>
+        </p:spPr>
+        <p:txBody>
+          <a:bodyPr wrap="none" rtlCol="0">
+            <a:spAutoFit/>
+          </a:bodyPr>
+          <a:lstStyle/>
+          <a:p>
+            <a:r>
+              <a:rPr lang="fr-FR" dirty="0"/>
+              <a:t>AVANT PAS BON UX UI</a:t>
+            </a:r>
+          </a:p>
+        </p:txBody>
+      </p:sp>
+      <p:sp>
+        <p:nvSpPr>
+          <p:cNvPr id="14" name="TextBox 13">
+            <a:extLst>
+              <a:ext uri="{FF2B5EF4-FFF2-40B4-BE49-F238E27FC236}">
+                <a16:creationId xmlns:a16="http://schemas.microsoft.com/office/drawing/2014/main" id="{3DE7B357-E2A5-BC0B-4A97-B07481E7B0C6}"/>
+              </a:ext>
+            </a:extLst>
+          </p:cNvPr>
+          <p:cNvSpPr txBox="1"/>
+          <p:nvPr/>
+        </p:nvSpPr>
+        <p:spPr>
+          <a:xfrm>
+            <a:off x="4752752" y="4273173"/>
+            <a:ext cx="1239442" cy="369332"/>
+          </a:xfrm>
+          <a:prstGeom prst="rect">
+            <a:avLst/>
+          </a:prstGeom>
+          <a:noFill/>
+        </p:spPr>
+        <p:txBody>
+          <a:bodyPr wrap="none" rtlCol="0">
+            <a:spAutoFit/>
+          </a:bodyPr>
+          <a:lstStyle/>
+          <a:p>
+            <a:r>
+              <a:rPr lang="fr-FR" dirty="0"/>
+              <a:t>APRES OK </a:t>
+            </a:r>
+          </a:p>
+        </p:txBody>
+      </p:sp>
+      <p:pic>
+        <p:nvPicPr>
+          <p:cNvPr id="16" name="Picture 15">
+            <a:extLst>
+              <a:ext uri="{FF2B5EF4-FFF2-40B4-BE49-F238E27FC236}">
+                <a16:creationId xmlns:a16="http://schemas.microsoft.com/office/drawing/2014/main" id="{0904C041-4F52-D5A8-6B0E-D19C90CF779F}"/>
+              </a:ext>
+            </a:extLst>
+          </p:cNvPr>
+          <p:cNvPicPr>
+            <a:picLocks noChangeAspect="1"/>
+          </p:cNvPicPr>
+          <p:nvPr/>
+        </p:nvPicPr>
+        <p:blipFill>
+          <a:blip r:embed="rId4"/>
+          <a:stretch>
+            <a:fillRect/>
+          </a:stretch>
+        </p:blipFill>
+        <p:spPr>
+          <a:xfrm>
+            <a:off x="1503942" y="638998"/>
+            <a:ext cx="8810625" cy="3495675"/>
+          </a:xfrm>
+          <a:prstGeom prst="rect">
+            <a:avLst/>
+          </a:prstGeom>
+        </p:spPr>
+      </p:pic>
+      <p:sp>
+        <p:nvSpPr>
+          <p:cNvPr id="18" name="TextBox 17">
+            <a:extLst>
+              <a:ext uri="{FF2B5EF4-FFF2-40B4-BE49-F238E27FC236}">
+                <a16:creationId xmlns:a16="http://schemas.microsoft.com/office/drawing/2014/main" id="{570641F1-F265-6EB1-18D5-0BC6894E6317}"/>
+              </a:ext>
+            </a:extLst>
+          </p:cNvPr>
+          <p:cNvSpPr txBox="1"/>
+          <p:nvPr/>
+        </p:nvSpPr>
+        <p:spPr>
+          <a:xfrm>
+            <a:off x="1503942" y="5579069"/>
+            <a:ext cx="431528" cy="369332"/>
+          </a:xfrm>
+          <a:prstGeom prst="rect">
+            <a:avLst/>
+          </a:prstGeom>
+          <a:noFill/>
+        </p:spPr>
+        <p:txBody>
+          <a:bodyPr wrap="none" rtlCol="0">
+            <a:spAutoFit/>
+          </a:bodyPr>
+          <a:lstStyle/>
+          <a:p>
+            <a:r>
+              <a:rPr lang="fr-FR" dirty="0"/>
+              <a:t>#2</a:t>
+            </a:r>
+          </a:p>
+        </p:txBody>
+      </p:sp>
+      <p:sp>
+        <p:nvSpPr>
+          <p:cNvPr id="19" name="TextBox 18">
+            <a:extLst>
+              <a:ext uri="{FF2B5EF4-FFF2-40B4-BE49-F238E27FC236}">
+                <a16:creationId xmlns:a16="http://schemas.microsoft.com/office/drawing/2014/main" id="{EC8C1319-2AD9-33D6-F087-4C74E9C6C58B}"/>
+              </a:ext>
+            </a:extLst>
+          </p:cNvPr>
+          <p:cNvSpPr txBox="1"/>
+          <p:nvPr/>
+        </p:nvSpPr>
+        <p:spPr>
+          <a:xfrm>
+            <a:off x="2130576" y="5471377"/>
+            <a:ext cx="6094206" cy="276999"/>
+          </a:xfrm>
+          <a:prstGeom prst="rect">
+            <a:avLst/>
+          </a:prstGeom>
+          <a:noFill/>
+        </p:spPr>
+        <p:txBody>
+          <a:bodyPr wrap="square">
+            <a:spAutoFit/>
+          </a:bodyPr>
+          <a:lstStyle/>
+          <a:p>
+            <a:r>
+              <a:rPr lang="en-US" sz="1200" b="1" i="0" dirty="0">
+                <a:solidFill>
+                  <a:srgbClr val="31333F"/>
+                </a:solidFill>
+                <a:effectLst/>
+                <a:latin typeface="Source Sans Pro" panose="020B0503030403020204" pitchFamily="34" charset="0"/>
+              </a:rPr>
+              <a:t>2024 Job </a:t>
+            </a:r>
+            <a:r>
+              <a:rPr lang="en-US" sz="1200" b="1" i="0" dirty="0" err="1">
+                <a:solidFill>
+                  <a:srgbClr val="31333F"/>
+                </a:solidFill>
+                <a:effectLst/>
+                <a:latin typeface="Source Sans Pro" panose="020B0503030403020204" pitchFamily="34" charset="0"/>
+              </a:rPr>
+              <a:t>Description_Chief</a:t>
+            </a:r>
+            <a:r>
+              <a:rPr lang="en-US" sz="1200" b="1" i="0" dirty="0">
+                <a:solidFill>
+                  <a:srgbClr val="31333F"/>
+                </a:solidFill>
+                <a:effectLst/>
+                <a:latin typeface="Source Sans Pro" panose="020B0503030403020204" pitchFamily="34" charset="0"/>
+              </a:rPr>
+              <a:t> Digital Experience Officer_R&amp;D-FORM-4-4.0-EN .docx</a:t>
+            </a:r>
+            <a:endParaRPr lang="fr-FR" sz="1200" dirty="0"/>
+          </a:p>
+        </p:txBody>
+      </p:sp>
+      <p:pic>
+        <p:nvPicPr>
+          <p:cNvPr id="20" name="Picture 19">
+            <a:extLst>
+              <a:ext uri="{FF2B5EF4-FFF2-40B4-BE49-F238E27FC236}">
+                <a16:creationId xmlns:a16="http://schemas.microsoft.com/office/drawing/2014/main" id="{9A8684C0-1D6E-170D-C280-D9A1C3D84ACB}"/>
+              </a:ext>
+            </a:extLst>
+          </p:cNvPr>
+          <p:cNvPicPr>
+            <a:picLocks noChangeAspect="1"/>
+          </p:cNvPicPr>
+          <p:nvPr/>
+        </p:nvPicPr>
+        <p:blipFill>
+          <a:blip r:embed="rId3"/>
+          <a:stretch>
+            <a:fillRect/>
+          </a:stretch>
+        </p:blipFill>
+        <p:spPr>
+          <a:xfrm>
+            <a:off x="9476299" y="5591525"/>
+            <a:ext cx="303875" cy="329198"/>
+          </a:xfrm>
+          <a:prstGeom prst="rect">
+            <a:avLst/>
+          </a:prstGeom>
+        </p:spPr>
+      </p:pic>
+      <p:pic>
+        <p:nvPicPr>
+          <p:cNvPr id="22" name="Picture 21">
+            <a:extLst>
+              <a:ext uri="{FF2B5EF4-FFF2-40B4-BE49-F238E27FC236}">
+                <a16:creationId xmlns:a16="http://schemas.microsoft.com/office/drawing/2014/main" id="{19B33FAF-DA05-2D66-69D6-BDCCDF737DCF}"/>
+              </a:ext>
+            </a:extLst>
+          </p:cNvPr>
+          <p:cNvPicPr>
+            <a:picLocks noChangeAspect="1"/>
+          </p:cNvPicPr>
+          <p:nvPr/>
+        </p:nvPicPr>
+        <p:blipFill>
+          <a:blip r:embed="rId5"/>
+          <a:stretch>
+            <a:fillRect/>
+          </a:stretch>
+        </p:blipFill>
+        <p:spPr>
+          <a:xfrm>
+            <a:off x="2219381" y="5724171"/>
+            <a:ext cx="3743325" cy="276225"/>
+          </a:xfrm>
+          <a:prstGeom prst="rect">
+            <a:avLst/>
+          </a:prstGeom>
+        </p:spPr>
+      </p:pic>
+      <p:cxnSp>
+        <p:nvCxnSpPr>
+          <p:cNvPr id="24" name="Straight Connector 23">
+            <a:extLst>
+              <a:ext uri="{FF2B5EF4-FFF2-40B4-BE49-F238E27FC236}">
+                <a16:creationId xmlns:a16="http://schemas.microsoft.com/office/drawing/2014/main" id="{9BBB9227-AAC0-4C81-0532-27563D26589C}"/>
+              </a:ext>
+            </a:extLst>
+          </p:cNvPr>
+          <p:cNvCxnSpPr/>
+          <p:nvPr/>
+        </p:nvCxnSpPr>
+        <p:spPr>
+          <a:xfrm>
+            <a:off x="1503942" y="5448447"/>
+            <a:ext cx="8489912" cy="0"/>
+          </a:xfrm>
+          <a:prstGeom prst="line">
+            <a:avLst/>
+          </a:prstGeom>
+          <a:ln w="3175">
+            <a:solidFill>
+              <a:schemeClr val="bg1">
+                <a:lumMod val="85000"/>
+              </a:schemeClr>
+            </a:solidFill>
+          </a:ln>
+        </p:spPr>
+        <p:style>
+          <a:lnRef idx="2">
+            <a:schemeClr val="accent1"/>
+          </a:lnRef>
+          <a:fillRef idx="0">
+            <a:schemeClr val="accent1"/>
+          </a:fillRef>
+          <a:effectRef idx="1">
+            <a:schemeClr val="accent1"/>
+          </a:effectRef>
+          <a:fontRef idx="minor">
+            <a:schemeClr val="tx1"/>
+          </a:fontRef>
+        </p:style>
+      </p:cxnSp>
+    </p:spTree>
+    <p:extLst>
+      <p:ext uri="{BB962C8B-B14F-4D97-AF65-F5344CB8AC3E}">
+        <p14:creationId xmlns:p14="http://schemas.microsoft.com/office/powerpoint/2010/main" val="2949732544"/>
       </p:ext>
     </p:extLst>
   </p:cSld>

</xml_diff>

<commit_message>
cleaning de la base
</commit_message>
<xml_diff>
--- a/docs/features.pptx
+++ b/docs/features.pptx
@@ -8,6 +8,7 @@
     <p:sldId id="256" r:id="rId2"/>
     <p:sldId id="257" r:id="rId3"/>
     <p:sldId id="258" r:id="rId4"/>
+    <p:sldId id="259" r:id="rId5"/>
   </p:sldIdLst>
   <p:sldSz cx="12192000" cy="6858000"/>
   <p:notesSz cx="6858000" cy="9144000"/>
@@ -443,7 +444,7 @@
           <a:p>
             <a:fld id="{4A312362-86E4-4761-8656-F6268DCA2FD0}" type="datetimeFigureOut">
               <a:rPr lang="fr-FR" smtClean="0"/>
-              <a:t>26/12/2024</a:t>
+              <a:t>27/12/2024</a:t>
             </a:fld>
             <a:endParaRPr lang="fr-FR"/>
           </a:p>
@@ -643,7 +644,7 @@
           <a:p>
             <a:fld id="{4A312362-86E4-4761-8656-F6268DCA2FD0}" type="datetimeFigureOut">
               <a:rPr lang="fr-FR" smtClean="0"/>
-              <a:t>26/12/2024</a:t>
+              <a:t>27/12/2024</a:t>
             </a:fld>
             <a:endParaRPr lang="fr-FR"/>
           </a:p>
@@ -853,7 +854,7 @@
           <a:p>
             <a:fld id="{4A312362-86E4-4761-8656-F6268DCA2FD0}" type="datetimeFigureOut">
               <a:rPr lang="fr-FR" smtClean="0"/>
-              <a:t>26/12/2024</a:t>
+              <a:t>27/12/2024</a:t>
             </a:fld>
             <a:endParaRPr lang="fr-FR"/>
           </a:p>
@@ -1053,7 +1054,7 @@
           <a:p>
             <a:fld id="{4A312362-86E4-4761-8656-F6268DCA2FD0}" type="datetimeFigureOut">
               <a:rPr lang="fr-FR" smtClean="0"/>
-              <a:t>26/12/2024</a:t>
+              <a:t>27/12/2024</a:t>
             </a:fld>
             <a:endParaRPr lang="fr-FR"/>
           </a:p>
@@ -1329,7 +1330,7 @@
           <a:p>
             <a:fld id="{4A312362-86E4-4761-8656-F6268DCA2FD0}" type="datetimeFigureOut">
               <a:rPr lang="fr-FR" smtClean="0"/>
-              <a:t>26/12/2024</a:t>
+              <a:t>27/12/2024</a:t>
             </a:fld>
             <a:endParaRPr lang="fr-FR"/>
           </a:p>
@@ -1597,7 +1598,7 @@
           <a:p>
             <a:fld id="{4A312362-86E4-4761-8656-F6268DCA2FD0}" type="datetimeFigureOut">
               <a:rPr lang="fr-FR" smtClean="0"/>
-              <a:t>26/12/2024</a:t>
+              <a:t>27/12/2024</a:t>
             </a:fld>
             <a:endParaRPr lang="fr-FR"/>
           </a:p>
@@ -2012,7 +2013,7 @@
           <a:p>
             <a:fld id="{4A312362-86E4-4761-8656-F6268DCA2FD0}" type="datetimeFigureOut">
               <a:rPr lang="fr-FR" smtClean="0"/>
-              <a:t>26/12/2024</a:t>
+              <a:t>27/12/2024</a:t>
             </a:fld>
             <a:endParaRPr lang="fr-FR"/>
           </a:p>
@@ -2154,7 +2155,7 @@
           <a:p>
             <a:fld id="{4A312362-86E4-4761-8656-F6268DCA2FD0}" type="datetimeFigureOut">
               <a:rPr lang="fr-FR" smtClean="0"/>
-              <a:t>26/12/2024</a:t>
+              <a:t>27/12/2024</a:t>
             </a:fld>
             <a:endParaRPr lang="fr-FR"/>
           </a:p>
@@ -2267,7 +2268,7 @@
           <a:p>
             <a:fld id="{4A312362-86E4-4761-8656-F6268DCA2FD0}" type="datetimeFigureOut">
               <a:rPr lang="fr-FR" smtClean="0"/>
-              <a:t>26/12/2024</a:t>
+              <a:t>27/12/2024</a:t>
             </a:fld>
             <a:endParaRPr lang="fr-FR"/>
           </a:p>
@@ -2580,7 +2581,7 @@
           <a:p>
             <a:fld id="{4A312362-86E4-4761-8656-F6268DCA2FD0}" type="datetimeFigureOut">
               <a:rPr lang="fr-FR" smtClean="0"/>
-              <a:t>26/12/2024</a:t>
+              <a:t>27/12/2024</a:t>
             </a:fld>
             <a:endParaRPr lang="fr-FR"/>
           </a:p>
@@ -2869,7 +2870,7 @@
           <a:p>
             <a:fld id="{4A312362-86E4-4761-8656-F6268DCA2FD0}" type="datetimeFigureOut">
               <a:rPr lang="fr-FR" smtClean="0"/>
-              <a:t>26/12/2024</a:t>
+              <a:t>27/12/2024</a:t>
             </a:fld>
             <a:endParaRPr lang="fr-FR"/>
           </a:p>
@@ -3112,7 +3113,7 @@
           <a:p>
             <a:fld id="{4A312362-86E4-4761-8656-F6268DCA2FD0}" type="datetimeFigureOut">
               <a:rPr lang="fr-FR" smtClean="0"/>
-              <a:t>26/12/2024</a:t>
+              <a:t>27/12/2024</a:t>
             </a:fld>
             <a:endParaRPr lang="fr-FR"/>
           </a:p>
@@ -5585,6 +5586,396 @@
     <p:extLst>
       <p:ext uri="{BB962C8B-B14F-4D97-AF65-F5344CB8AC3E}">
         <p14:creationId xmlns:p14="http://schemas.microsoft.com/office/powerpoint/2010/main" val="479488143"/>
+      </p:ext>
+    </p:extLst>
+  </p:cSld>
+  <p:clrMapOvr>
+    <a:masterClrMapping/>
+  </p:clrMapOvr>
+</p:sld>
+</file>
+
+<file path=ppt/slides/slide4.xml><?xml version="1.0" encoding="utf-8"?>
+<p:sld xmlns:a="http://schemas.openxmlformats.org/drawingml/2006/main" xmlns:r="http://schemas.openxmlformats.org/officeDocument/2006/relationships" xmlns:p="http://schemas.openxmlformats.org/presentationml/2006/main">
+  <p:cSld>
+    <p:spTree>
+      <p:nvGrpSpPr>
+        <p:cNvPr id="1" name=""/>
+        <p:cNvGrpSpPr/>
+        <p:nvPr/>
+      </p:nvGrpSpPr>
+      <p:grpSpPr>
+        <a:xfrm>
+          <a:off x="0" y="0"/>
+          <a:ext cx="0" cy="0"/>
+          <a:chOff x="0" y="0"/>
+          <a:chExt cx="0" cy="0"/>
+        </a:xfrm>
+      </p:grpSpPr>
+      <p:pic>
+        <p:nvPicPr>
+          <p:cNvPr id="5" name="Picture 4">
+            <a:extLst>
+              <a:ext uri="{FF2B5EF4-FFF2-40B4-BE49-F238E27FC236}">
+                <a16:creationId xmlns:a16="http://schemas.microsoft.com/office/drawing/2014/main" id="{FA3C36EE-FCB2-D47F-97C1-994196E24D1F}"/>
+              </a:ext>
+            </a:extLst>
+          </p:cNvPr>
+          <p:cNvPicPr>
+            <a:picLocks noChangeAspect="1"/>
+          </p:cNvPicPr>
+          <p:nvPr/>
+        </p:nvPicPr>
+        <p:blipFill>
+          <a:blip r:embed="rId2"/>
+          <a:stretch>
+            <a:fillRect/>
+          </a:stretch>
+        </p:blipFill>
+        <p:spPr>
+          <a:xfrm>
+            <a:off x="2247787" y="139972"/>
+            <a:ext cx="6476664" cy="3099049"/>
+          </a:xfrm>
+          <a:prstGeom prst="rect">
+            <a:avLst/>
+          </a:prstGeom>
+        </p:spPr>
+      </p:pic>
+      <p:pic>
+        <p:nvPicPr>
+          <p:cNvPr id="6" name="Picture 5">
+            <a:extLst>
+              <a:ext uri="{FF2B5EF4-FFF2-40B4-BE49-F238E27FC236}">
+                <a16:creationId xmlns:a16="http://schemas.microsoft.com/office/drawing/2014/main" id="{3B4058DE-2DE5-7E02-BCB4-0E0B28BF3E88}"/>
+              </a:ext>
+            </a:extLst>
+          </p:cNvPr>
+          <p:cNvPicPr>
+            <a:picLocks noChangeAspect="1"/>
+          </p:cNvPicPr>
+          <p:nvPr/>
+        </p:nvPicPr>
+        <p:blipFill>
+          <a:blip r:embed="rId2"/>
+          <a:srcRect b="23571"/>
+          <a:stretch/>
+        </p:blipFill>
+        <p:spPr>
+          <a:xfrm>
+            <a:off x="2247787" y="4010801"/>
+            <a:ext cx="6476664" cy="2368582"/>
+          </a:xfrm>
+          <a:prstGeom prst="rect">
+            <a:avLst/>
+          </a:prstGeom>
+        </p:spPr>
+      </p:pic>
+      <p:pic>
+        <p:nvPicPr>
+          <p:cNvPr id="8" name="Picture 7">
+            <a:extLst>
+              <a:ext uri="{FF2B5EF4-FFF2-40B4-BE49-F238E27FC236}">
+                <a16:creationId xmlns:a16="http://schemas.microsoft.com/office/drawing/2014/main" id="{2F2C40A6-24C6-71C6-2121-CC20D2CDE8A0}"/>
+              </a:ext>
+            </a:extLst>
+          </p:cNvPr>
+          <p:cNvPicPr>
+            <a:picLocks noChangeAspect="1"/>
+          </p:cNvPicPr>
+          <p:nvPr/>
+        </p:nvPicPr>
+        <p:blipFill>
+          <a:blip r:embed="rId3"/>
+          <a:stretch>
+            <a:fillRect/>
+          </a:stretch>
+        </p:blipFill>
+        <p:spPr>
+          <a:xfrm>
+            <a:off x="2473979" y="4782579"/>
+            <a:ext cx="2295525" cy="523875"/>
+          </a:xfrm>
+          <a:prstGeom prst="rect">
+            <a:avLst/>
+          </a:prstGeom>
+        </p:spPr>
+      </p:pic>
+      <p:pic>
+        <p:nvPicPr>
+          <p:cNvPr id="10" name="Picture 9">
+            <a:extLst>
+              <a:ext uri="{FF2B5EF4-FFF2-40B4-BE49-F238E27FC236}">
+                <a16:creationId xmlns:a16="http://schemas.microsoft.com/office/drawing/2014/main" id="{C76FA8C5-E1C5-7EB5-62F6-EF909A54EBCA}"/>
+              </a:ext>
+            </a:extLst>
+          </p:cNvPr>
+          <p:cNvPicPr>
+            <a:picLocks noChangeAspect="1"/>
+          </p:cNvPicPr>
+          <p:nvPr/>
+        </p:nvPicPr>
+        <p:blipFill>
+          <a:blip r:embed="rId3"/>
+          <a:stretch>
+            <a:fillRect/>
+          </a:stretch>
+        </p:blipFill>
+        <p:spPr>
+          <a:xfrm>
+            <a:off x="6206882" y="4782579"/>
+            <a:ext cx="2295525" cy="523875"/>
+          </a:xfrm>
+          <a:prstGeom prst="rect">
+            <a:avLst/>
+          </a:prstGeom>
+        </p:spPr>
+      </p:pic>
+      <p:pic>
+        <p:nvPicPr>
+          <p:cNvPr id="14" name="Picture 13">
+            <a:extLst>
+              <a:ext uri="{FF2B5EF4-FFF2-40B4-BE49-F238E27FC236}">
+                <a16:creationId xmlns:a16="http://schemas.microsoft.com/office/drawing/2014/main" id="{6265EDE1-04A5-4581-B8D5-1F0A2EC9CBF0}"/>
+              </a:ext>
+            </a:extLst>
+          </p:cNvPr>
+          <p:cNvPicPr>
+            <a:picLocks noChangeAspect="1"/>
+          </p:cNvPicPr>
+          <p:nvPr/>
+        </p:nvPicPr>
+        <p:blipFill>
+          <a:blip r:embed="rId2"/>
+          <a:srcRect t="57533"/>
+          <a:stretch/>
+        </p:blipFill>
+        <p:spPr>
+          <a:xfrm>
+            <a:off x="2247787" y="5193143"/>
+            <a:ext cx="6476664" cy="1316071"/>
+          </a:xfrm>
+          <a:prstGeom prst="rect">
+            <a:avLst/>
+          </a:prstGeom>
+        </p:spPr>
+      </p:pic>
+      <p:pic>
+        <p:nvPicPr>
+          <p:cNvPr id="16" name="Picture 15">
+            <a:extLst>
+              <a:ext uri="{FF2B5EF4-FFF2-40B4-BE49-F238E27FC236}">
+                <a16:creationId xmlns:a16="http://schemas.microsoft.com/office/drawing/2014/main" id="{AF1A6906-0F37-B0D1-6653-4BB586190264}"/>
+              </a:ext>
+            </a:extLst>
+          </p:cNvPr>
+          <p:cNvPicPr>
+            <a:picLocks noChangeAspect="1"/>
+          </p:cNvPicPr>
+          <p:nvPr/>
+        </p:nvPicPr>
+        <p:blipFill>
+          <a:blip r:embed="rId4"/>
+          <a:stretch>
+            <a:fillRect/>
+          </a:stretch>
+        </p:blipFill>
+        <p:spPr>
+          <a:xfrm>
+            <a:off x="7354644" y="4812143"/>
+            <a:ext cx="1076325" cy="381000"/>
+          </a:xfrm>
+          <a:prstGeom prst="rect">
+            <a:avLst/>
+          </a:prstGeom>
+        </p:spPr>
+      </p:pic>
+      <p:pic>
+        <p:nvPicPr>
+          <p:cNvPr id="18" name="Picture 17">
+            <a:extLst>
+              <a:ext uri="{FF2B5EF4-FFF2-40B4-BE49-F238E27FC236}">
+                <a16:creationId xmlns:a16="http://schemas.microsoft.com/office/drawing/2014/main" id="{CABCD55C-06E2-158F-AB35-8BC82AD1713F}"/>
+              </a:ext>
+            </a:extLst>
+          </p:cNvPr>
+          <p:cNvPicPr>
+            <a:picLocks noChangeAspect="1"/>
+          </p:cNvPicPr>
+          <p:nvPr/>
+        </p:nvPicPr>
+        <p:blipFill>
+          <a:blip r:embed="rId5"/>
+          <a:stretch>
+            <a:fillRect/>
+          </a:stretch>
+        </p:blipFill>
+        <p:spPr>
+          <a:xfrm>
+            <a:off x="2890698" y="4849749"/>
+            <a:ext cx="1276350" cy="276225"/>
+          </a:xfrm>
+          <a:prstGeom prst="rect">
+            <a:avLst/>
+          </a:prstGeom>
+        </p:spPr>
+      </p:pic>
+      <p:sp>
+        <p:nvSpPr>
+          <p:cNvPr id="20" name="TextBox 19">
+            <a:extLst>
+              <a:ext uri="{FF2B5EF4-FFF2-40B4-BE49-F238E27FC236}">
+                <a16:creationId xmlns:a16="http://schemas.microsoft.com/office/drawing/2014/main" id="{D312663C-C154-0D8E-3711-8F2A487D855D}"/>
+              </a:ext>
+            </a:extLst>
+          </p:cNvPr>
+          <p:cNvSpPr txBox="1"/>
+          <p:nvPr/>
+        </p:nvSpPr>
+        <p:spPr>
+          <a:xfrm>
+            <a:off x="2473979" y="4848920"/>
+            <a:ext cx="1850595" cy="307777"/>
+          </a:xfrm>
+          <a:prstGeom prst="rect">
+            <a:avLst/>
+          </a:prstGeom>
+          <a:noFill/>
+        </p:spPr>
+        <p:txBody>
+          <a:bodyPr wrap="square">
+            <a:spAutoFit/>
+          </a:bodyPr>
+          <a:lstStyle/>
+          <a:p>
+            <a:r>
+              <a:rPr lang="fr-FR" sz="1400" dirty="0"/>
+              <a:t>🗨️</a:t>
+            </a:r>
+          </a:p>
+        </p:txBody>
+      </p:sp>
+      <p:pic>
+        <p:nvPicPr>
+          <p:cNvPr id="22" name="Picture 21">
+            <a:extLst>
+              <a:ext uri="{FF2B5EF4-FFF2-40B4-BE49-F238E27FC236}">
+                <a16:creationId xmlns:a16="http://schemas.microsoft.com/office/drawing/2014/main" id="{FB5AEDB1-CD53-5FA0-4001-F0FCEEC447DA}"/>
+              </a:ext>
+            </a:extLst>
+          </p:cNvPr>
+          <p:cNvPicPr>
+            <a:picLocks noChangeAspect="1"/>
+          </p:cNvPicPr>
+          <p:nvPr/>
+        </p:nvPicPr>
+        <p:blipFill>
+          <a:blip r:embed="rId6"/>
+          <a:stretch>
+            <a:fillRect/>
+          </a:stretch>
+        </p:blipFill>
+        <p:spPr>
+          <a:xfrm>
+            <a:off x="8044897" y="4882347"/>
+            <a:ext cx="228600" cy="219075"/>
+          </a:xfrm>
+          <a:prstGeom prst="rect">
+            <a:avLst/>
+          </a:prstGeom>
+        </p:spPr>
+      </p:pic>
+      <p:sp>
+        <p:nvSpPr>
+          <p:cNvPr id="24" name="TextBox 23">
+            <a:extLst>
+              <a:ext uri="{FF2B5EF4-FFF2-40B4-BE49-F238E27FC236}">
+                <a16:creationId xmlns:a16="http://schemas.microsoft.com/office/drawing/2014/main" id="{2FFB9E5B-A3F3-2D50-48A5-592AF4D9FF19}"/>
+              </a:ext>
+            </a:extLst>
+          </p:cNvPr>
+          <p:cNvSpPr txBox="1"/>
+          <p:nvPr/>
+        </p:nvSpPr>
+        <p:spPr>
+          <a:xfrm>
+            <a:off x="7354644" y="4864750"/>
+            <a:ext cx="473206" cy="246221"/>
+          </a:xfrm>
+          <a:prstGeom prst="rect">
+            <a:avLst/>
+          </a:prstGeom>
+          <a:noFill/>
+        </p:spPr>
+        <p:txBody>
+          <a:bodyPr wrap="none" rtlCol="0">
+            <a:spAutoFit/>
+          </a:bodyPr>
+          <a:lstStyle/>
+          <a:p>
+            <a:r>
+              <a:rPr lang="fr-FR" sz="1000" dirty="0">
+                <a:solidFill>
+                  <a:schemeClr val="bg1">
+                    <a:lumMod val="50000"/>
+                  </a:schemeClr>
+                </a:solidFill>
+              </a:rPr>
+              <a:t>Tools</a:t>
+            </a:r>
+          </a:p>
+        </p:txBody>
+      </p:sp>
+      <p:sp>
+        <p:nvSpPr>
+          <p:cNvPr id="25" name="Arrow: Down 24">
+            <a:extLst>
+              <a:ext uri="{FF2B5EF4-FFF2-40B4-BE49-F238E27FC236}">
+                <a16:creationId xmlns:a16="http://schemas.microsoft.com/office/drawing/2014/main" id="{46F51537-FFBD-7143-FBA3-D5831EB006FF}"/>
+              </a:ext>
+            </a:extLst>
+          </p:cNvPr>
+          <p:cNvSpPr/>
+          <p:nvPr/>
+        </p:nvSpPr>
+        <p:spPr>
+          <a:xfrm>
+            <a:off x="5228216" y="2979868"/>
+            <a:ext cx="656217" cy="1108038"/>
+          </a:xfrm>
+          <a:prstGeom prst="downArrow">
+            <a:avLst/>
+          </a:prstGeom>
+        </p:spPr>
+        <p:style>
+          <a:lnRef idx="2">
+            <a:schemeClr val="accent1">
+              <a:shade val="15000"/>
+            </a:schemeClr>
+          </a:lnRef>
+          <a:fillRef idx="1">
+            <a:schemeClr val="accent1"/>
+          </a:fillRef>
+          <a:effectRef idx="0">
+            <a:schemeClr val="accent1"/>
+          </a:effectRef>
+          <a:fontRef idx="minor">
+            <a:schemeClr val="lt1"/>
+          </a:fontRef>
+        </p:style>
+        <p:txBody>
+          <a:bodyPr rtlCol="0" anchor="ctr"/>
+          <a:lstStyle/>
+          <a:p>
+            <a:pPr algn="ctr"/>
+            <a:endParaRPr lang="fr-FR"/>
+          </a:p>
+        </p:txBody>
+      </p:sp>
+    </p:spTree>
+    <p:extLst>
+      <p:ext uri="{BB962C8B-B14F-4D97-AF65-F5344CB8AC3E}">
+        <p14:creationId xmlns:p14="http://schemas.microsoft.com/office/powerpoint/2010/main" val="2098284777"/>
       </p:ext>
     </p:extLst>
   </p:cSld>

</xml_diff>

<commit_message>
RAG step 3 : process document
</commit_message>
<xml_diff>
--- a/docs/features.pptx
+++ b/docs/features.pptx
@@ -7,9 +7,10 @@
   <p:sldIdLst>
     <p:sldId id="256" r:id="rId2"/>
     <p:sldId id="257" r:id="rId3"/>
-    <p:sldId id="258" r:id="rId4"/>
-    <p:sldId id="259" r:id="rId5"/>
-    <p:sldId id="260" r:id="rId6"/>
+    <p:sldId id="261" r:id="rId4"/>
+    <p:sldId id="258" r:id="rId5"/>
+    <p:sldId id="259" r:id="rId6"/>
+    <p:sldId id="260" r:id="rId7"/>
   </p:sldIdLst>
   <p:sldSz cx="12192000" cy="6858000"/>
   <p:notesSz cx="6858000" cy="9144000"/>
@@ -119,7 +120,7 @@
 <file path=ppt/revisionInfo.xml><?xml version="1.0" encoding="utf-8"?>
 <p1510:revInfo xmlns:a="http://schemas.openxmlformats.org/drawingml/2006/main" xmlns:r="http://schemas.openxmlformats.org/officeDocument/2006/relationships" xmlns:p1510="http://schemas.microsoft.com/office/powerpoint/2015/10/main">
   <p1510:revLst>
-    <p1510:client id="{A27BCA89-8643-4CA3-8099-F5CF2C0E2EA9}" v="10" dt="2024-12-29T15:10:31.517"/>
+    <p1510:client id="{A27BCA89-8643-4CA3-8099-F5CF2C0E2EA9}" v="17" dt="2024-12-30T09:52:12.296"/>
   </p1510:revLst>
 </p1510:revInfo>
 </file>
@@ -129,10 +130,97 @@
   <pc:docChgLst>
     <pc:chgData name="Willy STOPHE" userId="bfa348040ab50133" providerId="LiveId" clId="{A27BCA89-8643-4CA3-8099-F5CF2C0E2EA9}"/>
     <pc:docChg chg="undo custSel addSld delSld modSld">
-      <pc:chgData name="Willy STOPHE" userId="bfa348040ab50133" providerId="LiveId" clId="{A27BCA89-8643-4CA3-8099-F5CF2C0E2EA9}" dt="2024-12-29T15:12:40.413" v="117" actId="6549"/>
+      <pc:chgData name="Willy STOPHE" userId="bfa348040ab50133" providerId="LiveId" clId="{A27BCA89-8643-4CA3-8099-F5CF2C0E2EA9}" dt="2024-12-30T09:58:38.662" v="155" actId="14100"/>
       <pc:docMkLst>
         <pc:docMk/>
       </pc:docMkLst>
+      <pc:sldChg chg="addSp delSp modSp mod">
+        <pc:chgData name="Willy STOPHE" userId="bfa348040ab50133" providerId="LiveId" clId="{A27BCA89-8643-4CA3-8099-F5CF2C0E2EA9}" dt="2024-12-30T09:52:23.545" v="147" actId="478"/>
+        <pc:sldMkLst>
+          <pc:docMk/>
+          <pc:sldMk cId="4166407404" sldId="257"/>
+        </pc:sldMkLst>
+        <pc:spChg chg="add del mod">
+          <ac:chgData name="Willy STOPHE" userId="bfa348040ab50133" providerId="LiveId" clId="{A27BCA89-8643-4CA3-8099-F5CF2C0E2EA9}" dt="2024-12-30T09:52:23.545" v="147" actId="478"/>
+          <ac:spMkLst>
+            <pc:docMk/>
+            <pc:sldMk cId="4166407404" sldId="257"/>
+            <ac:spMk id="4" creationId="{5412A95D-560E-9B76-D98D-57B8483D1156}"/>
+          </ac:spMkLst>
+        </pc:spChg>
+        <pc:spChg chg="add del mod">
+          <ac:chgData name="Willy STOPHE" userId="bfa348040ab50133" providerId="LiveId" clId="{A27BCA89-8643-4CA3-8099-F5CF2C0E2EA9}" dt="2024-12-30T09:52:23.545" v="147" actId="478"/>
+          <ac:spMkLst>
+            <pc:docMk/>
+            <pc:sldMk cId="4166407404" sldId="257"/>
+            <ac:spMk id="6" creationId="{3019A930-FB59-2174-91C5-8B95E7609547}"/>
+          </ac:spMkLst>
+        </pc:spChg>
+        <pc:spChg chg="add del mod">
+          <ac:chgData name="Willy STOPHE" userId="bfa348040ab50133" providerId="LiveId" clId="{A27BCA89-8643-4CA3-8099-F5CF2C0E2EA9}" dt="2024-12-30T09:52:23.545" v="147" actId="478"/>
+          <ac:spMkLst>
+            <pc:docMk/>
+            <pc:sldMk cId="4166407404" sldId="257"/>
+            <ac:spMk id="7" creationId="{BBF674FD-EDC7-78A7-8E72-50719823022A}"/>
+          </ac:spMkLst>
+        </pc:spChg>
+        <pc:spChg chg="add del mod">
+          <ac:chgData name="Willy STOPHE" userId="bfa348040ab50133" providerId="LiveId" clId="{A27BCA89-8643-4CA3-8099-F5CF2C0E2EA9}" dt="2024-12-30T09:52:23.545" v="147" actId="478"/>
+          <ac:spMkLst>
+            <pc:docMk/>
+            <pc:sldMk cId="4166407404" sldId="257"/>
+            <ac:spMk id="8" creationId="{1938A094-122B-EF22-69D1-31C3C3DC8CD7}"/>
+          </ac:spMkLst>
+        </pc:spChg>
+        <pc:spChg chg="add del mod">
+          <ac:chgData name="Willy STOPHE" userId="bfa348040ab50133" providerId="LiveId" clId="{A27BCA89-8643-4CA3-8099-F5CF2C0E2EA9}" dt="2024-12-30T09:52:23.545" v="147" actId="478"/>
+          <ac:spMkLst>
+            <pc:docMk/>
+            <pc:sldMk cId="4166407404" sldId="257"/>
+            <ac:spMk id="9" creationId="{C97DC155-3A52-6CFB-5E84-5215683678D3}"/>
+          </ac:spMkLst>
+        </pc:spChg>
+        <pc:spChg chg="add del mod">
+          <ac:chgData name="Willy STOPHE" userId="bfa348040ab50133" providerId="LiveId" clId="{A27BCA89-8643-4CA3-8099-F5CF2C0E2EA9}" dt="2024-12-30T09:52:23.545" v="147" actId="478"/>
+          <ac:spMkLst>
+            <pc:docMk/>
+            <pc:sldMk cId="4166407404" sldId="257"/>
+            <ac:spMk id="10" creationId="{71A4FE1C-8077-1B35-5248-38A30E28C8FC}"/>
+          </ac:spMkLst>
+        </pc:spChg>
+        <pc:spChg chg="add del mod">
+          <ac:chgData name="Willy STOPHE" userId="bfa348040ab50133" providerId="LiveId" clId="{A27BCA89-8643-4CA3-8099-F5CF2C0E2EA9}" dt="2024-12-30T09:52:23.545" v="147" actId="478"/>
+          <ac:spMkLst>
+            <pc:docMk/>
+            <pc:sldMk cId="4166407404" sldId="257"/>
+            <ac:spMk id="11" creationId="{C3D199DE-E029-C134-470E-21444116F3B1}"/>
+          </ac:spMkLst>
+        </pc:spChg>
+        <pc:spChg chg="add del mod">
+          <ac:chgData name="Willy STOPHE" userId="bfa348040ab50133" providerId="LiveId" clId="{A27BCA89-8643-4CA3-8099-F5CF2C0E2EA9}" dt="2024-12-30T09:52:23.545" v="147" actId="478"/>
+          <ac:spMkLst>
+            <pc:docMk/>
+            <pc:sldMk cId="4166407404" sldId="257"/>
+            <ac:spMk id="12" creationId="{39C43CBF-539D-1C91-9CFE-A09732630822}"/>
+          </ac:spMkLst>
+        </pc:spChg>
+        <pc:picChg chg="add mod ord modCrop">
+          <ac:chgData name="Willy STOPHE" userId="bfa348040ab50133" providerId="LiveId" clId="{A27BCA89-8643-4CA3-8099-F5CF2C0E2EA9}" dt="2024-12-30T09:51:57.318" v="145" actId="732"/>
+          <ac:picMkLst>
+            <pc:docMk/>
+            <pc:sldMk cId="4166407404" sldId="257"/>
+            <ac:picMk id="3" creationId="{339E2965-EB02-284E-549A-1081A82E5B40}"/>
+          </ac:picMkLst>
+        </pc:picChg>
+        <pc:picChg chg="del">
+          <ac:chgData name="Willy STOPHE" userId="bfa348040ab50133" providerId="LiveId" clId="{A27BCA89-8643-4CA3-8099-F5CF2C0E2EA9}" dt="2024-12-30T09:50:00.439" v="118" actId="478"/>
+          <ac:picMkLst>
+            <pc:docMk/>
+            <pc:sldMk cId="4166407404" sldId="257"/>
+            <ac:picMk id="5" creationId="{4CD2F9FD-D384-F41B-0FFC-5992D64D213A}"/>
+          </ac:picMkLst>
+        </pc:picChg>
+      </pc:sldChg>
       <pc:sldChg chg="addSp delSp modSp new del mod">
         <pc:chgData name="Willy STOPHE" userId="bfa348040ab50133" providerId="LiveId" clId="{A27BCA89-8643-4CA3-8099-F5CF2C0E2EA9}" dt="2024-12-26T13:15:55.762" v="80" actId="47"/>
         <pc:sldMkLst>
@@ -218,6 +306,61 @@
           <pc:sldMk cId="3232741750" sldId="260"/>
         </pc:sldMkLst>
       </pc:sldChg>
+      <pc:sldChg chg="modSp add mod">
+        <pc:chgData name="Willy STOPHE" userId="bfa348040ab50133" providerId="LiveId" clId="{A27BCA89-8643-4CA3-8099-F5CF2C0E2EA9}" dt="2024-12-30T09:58:38.662" v="155" actId="14100"/>
+        <pc:sldMkLst>
+          <pc:docMk/>
+          <pc:sldMk cId="1183068327" sldId="261"/>
+        </pc:sldMkLst>
+        <pc:spChg chg="mod">
+          <ac:chgData name="Willy STOPHE" userId="bfa348040ab50133" providerId="LiveId" clId="{A27BCA89-8643-4CA3-8099-F5CF2C0E2EA9}" dt="2024-12-30T09:53:54.844" v="150" actId="208"/>
+          <ac:spMkLst>
+            <pc:docMk/>
+            <pc:sldMk cId="1183068327" sldId="261"/>
+            <ac:spMk id="4" creationId="{99F900A8-259E-6CFB-1B31-2B9D341CA73D}"/>
+          </ac:spMkLst>
+        </pc:spChg>
+        <pc:spChg chg="mod">
+          <ac:chgData name="Willy STOPHE" userId="bfa348040ab50133" providerId="LiveId" clId="{A27BCA89-8643-4CA3-8099-F5CF2C0E2EA9}" dt="2024-12-30T09:54:44.797" v="151" actId="208"/>
+          <ac:spMkLst>
+            <pc:docMk/>
+            <pc:sldMk cId="1183068327" sldId="261"/>
+            <ac:spMk id="6" creationId="{9FA7BD92-E7F0-6290-4D0F-7B9C5B307335}"/>
+          </ac:spMkLst>
+        </pc:spChg>
+        <pc:spChg chg="mod">
+          <ac:chgData name="Willy STOPHE" userId="bfa348040ab50133" providerId="LiveId" clId="{A27BCA89-8643-4CA3-8099-F5CF2C0E2EA9}" dt="2024-12-30T09:58:32.254" v="153" actId="14100"/>
+          <ac:spMkLst>
+            <pc:docMk/>
+            <pc:sldMk cId="1183068327" sldId="261"/>
+            <ac:spMk id="7" creationId="{397F4CD3-5C33-AEAC-117F-656B13CF2B2A}"/>
+          </ac:spMkLst>
+        </pc:spChg>
+        <pc:spChg chg="mod">
+          <ac:chgData name="Willy STOPHE" userId="bfa348040ab50133" providerId="LiveId" clId="{A27BCA89-8643-4CA3-8099-F5CF2C0E2EA9}" dt="2024-12-30T09:58:29.656" v="152" actId="14100"/>
+          <ac:spMkLst>
+            <pc:docMk/>
+            <pc:sldMk cId="1183068327" sldId="261"/>
+            <ac:spMk id="8" creationId="{C21EA842-2C5C-BDBD-4F72-001F0DB26279}"/>
+          </ac:spMkLst>
+        </pc:spChg>
+        <pc:spChg chg="mod">
+          <ac:chgData name="Willy STOPHE" userId="bfa348040ab50133" providerId="LiveId" clId="{A27BCA89-8643-4CA3-8099-F5CF2C0E2EA9}" dt="2024-12-30T09:58:36.665" v="154" actId="14100"/>
+          <ac:spMkLst>
+            <pc:docMk/>
+            <pc:sldMk cId="1183068327" sldId="261"/>
+            <ac:spMk id="10" creationId="{3BA9F368-785B-CCB9-7EB2-4FD8C199ED0B}"/>
+          </ac:spMkLst>
+        </pc:spChg>
+        <pc:spChg chg="mod">
+          <ac:chgData name="Willy STOPHE" userId="bfa348040ab50133" providerId="LiveId" clId="{A27BCA89-8643-4CA3-8099-F5CF2C0E2EA9}" dt="2024-12-30T09:58:38.662" v="155" actId="14100"/>
+          <ac:spMkLst>
+            <pc:docMk/>
+            <pc:sldMk cId="1183068327" sldId="261"/>
+            <ac:spMk id="11" creationId="{EFD106CA-73F4-ECED-81AB-32941B4DF23A}"/>
+          </ac:spMkLst>
+        </pc:spChg>
+      </pc:sldChg>
     </pc:docChg>
   </pc:docChgLst>
 </pc:chgInfo>
@@ -372,7 +515,7 @@
           <a:p>
             <a:fld id="{4A312362-86E4-4761-8656-F6268DCA2FD0}" type="datetimeFigureOut">
               <a:rPr lang="fr-FR" smtClean="0"/>
-              <a:t>29/12/2024</a:t>
+              <a:t>30/12/2024</a:t>
             </a:fld>
             <a:endParaRPr lang="fr-FR"/>
           </a:p>
@@ -572,7 +715,7 @@
           <a:p>
             <a:fld id="{4A312362-86E4-4761-8656-F6268DCA2FD0}" type="datetimeFigureOut">
               <a:rPr lang="fr-FR" smtClean="0"/>
-              <a:t>29/12/2024</a:t>
+              <a:t>30/12/2024</a:t>
             </a:fld>
             <a:endParaRPr lang="fr-FR"/>
           </a:p>
@@ -782,7 +925,7 @@
           <a:p>
             <a:fld id="{4A312362-86E4-4761-8656-F6268DCA2FD0}" type="datetimeFigureOut">
               <a:rPr lang="fr-FR" smtClean="0"/>
-              <a:t>29/12/2024</a:t>
+              <a:t>30/12/2024</a:t>
             </a:fld>
             <a:endParaRPr lang="fr-FR"/>
           </a:p>
@@ -982,7 +1125,7 @@
           <a:p>
             <a:fld id="{4A312362-86E4-4761-8656-F6268DCA2FD0}" type="datetimeFigureOut">
               <a:rPr lang="fr-FR" smtClean="0"/>
-              <a:t>29/12/2024</a:t>
+              <a:t>30/12/2024</a:t>
             </a:fld>
             <a:endParaRPr lang="fr-FR"/>
           </a:p>
@@ -1258,7 +1401,7 @@
           <a:p>
             <a:fld id="{4A312362-86E4-4761-8656-F6268DCA2FD0}" type="datetimeFigureOut">
               <a:rPr lang="fr-FR" smtClean="0"/>
-              <a:t>29/12/2024</a:t>
+              <a:t>30/12/2024</a:t>
             </a:fld>
             <a:endParaRPr lang="fr-FR"/>
           </a:p>
@@ -1526,7 +1669,7 @@
           <a:p>
             <a:fld id="{4A312362-86E4-4761-8656-F6268DCA2FD0}" type="datetimeFigureOut">
               <a:rPr lang="fr-FR" smtClean="0"/>
-              <a:t>29/12/2024</a:t>
+              <a:t>30/12/2024</a:t>
             </a:fld>
             <a:endParaRPr lang="fr-FR"/>
           </a:p>
@@ -1941,7 +2084,7 @@
           <a:p>
             <a:fld id="{4A312362-86E4-4761-8656-F6268DCA2FD0}" type="datetimeFigureOut">
               <a:rPr lang="fr-FR" smtClean="0"/>
-              <a:t>29/12/2024</a:t>
+              <a:t>30/12/2024</a:t>
             </a:fld>
             <a:endParaRPr lang="fr-FR"/>
           </a:p>
@@ -2083,7 +2226,7 @@
           <a:p>
             <a:fld id="{4A312362-86E4-4761-8656-F6268DCA2FD0}" type="datetimeFigureOut">
               <a:rPr lang="fr-FR" smtClean="0"/>
-              <a:t>29/12/2024</a:t>
+              <a:t>30/12/2024</a:t>
             </a:fld>
             <a:endParaRPr lang="fr-FR"/>
           </a:p>
@@ -2196,7 +2339,7 @@
           <a:p>
             <a:fld id="{4A312362-86E4-4761-8656-F6268DCA2FD0}" type="datetimeFigureOut">
               <a:rPr lang="fr-FR" smtClean="0"/>
-              <a:t>29/12/2024</a:t>
+              <a:t>30/12/2024</a:t>
             </a:fld>
             <a:endParaRPr lang="fr-FR"/>
           </a:p>
@@ -2509,7 +2652,7 @@
           <a:p>
             <a:fld id="{4A312362-86E4-4761-8656-F6268DCA2FD0}" type="datetimeFigureOut">
               <a:rPr lang="fr-FR" smtClean="0"/>
-              <a:t>29/12/2024</a:t>
+              <a:t>30/12/2024</a:t>
             </a:fld>
             <a:endParaRPr lang="fr-FR"/>
           </a:p>
@@ -2798,7 +2941,7 @@
           <a:p>
             <a:fld id="{4A312362-86E4-4761-8656-F6268DCA2FD0}" type="datetimeFigureOut">
               <a:rPr lang="fr-FR" smtClean="0"/>
-              <a:t>29/12/2024</a:t>
+              <a:t>30/12/2024</a:t>
             </a:fld>
             <a:endParaRPr lang="fr-FR"/>
           </a:p>
@@ -3041,7 +3184,7 @@
           <a:p>
             <a:fld id="{4A312362-86E4-4761-8656-F6268DCA2FD0}" type="datetimeFigureOut">
               <a:rPr lang="fr-FR" smtClean="0"/>
-              <a:t>29/12/2024</a:t>
+              <a:t>30/12/2024</a:t>
             </a:fld>
             <a:endParaRPr lang="fr-FR"/>
           </a:p>
@@ -4928,10 +5071,10 @@
       </p:grpSpPr>
       <p:pic>
         <p:nvPicPr>
-          <p:cNvPr id="5" name="Picture 4">
-            <a:extLst>
-              <a:ext uri="{FF2B5EF4-FFF2-40B4-BE49-F238E27FC236}">
-                <a16:creationId xmlns:a16="http://schemas.microsoft.com/office/drawing/2014/main" id="{4CD2F9FD-D384-F41B-0FFC-5992D64D213A}"/>
+          <p:cNvPr id="3" name="Picture 2">
+            <a:extLst>
+              <a:ext uri="{FF2B5EF4-FFF2-40B4-BE49-F238E27FC236}">
+                <a16:creationId xmlns:a16="http://schemas.microsoft.com/office/drawing/2014/main" id="{339E2965-EB02-284E-549A-1081A82E5B40}"/>
               </a:ext>
             </a:extLst>
           </p:cNvPr>
@@ -4942,14 +5085,13 @@
         </p:nvPicPr>
         <p:blipFill>
           <a:blip r:embed="rId2"/>
-          <a:stretch>
-            <a:fillRect/>
-          </a:stretch>
+          <a:srcRect t="1384" b="-1384"/>
+          <a:stretch/>
         </p:blipFill>
         <p:spPr>
           <a:xfrm>
-            <a:off x="0" y="546100"/>
-            <a:ext cx="12192000" cy="5765800"/>
+            <a:off x="0" y="627368"/>
+            <a:ext cx="12192000" cy="5762799"/>
           </a:xfrm>
           <a:prstGeom prst="rect">
             <a:avLst/>
@@ -4974,7 +5116,13 @@
   <p:cSld>
     <p:spTree>
       <p:nvGrpSpPr>
-        <p:cNvPr id="1" name=""/>
+        <p:cNvPr id="1" name="">
+          <a:extLst>
+            <a:ext uri="{FF2B5EF4-FFF2-40B4-BE49-F238E27FC236}">
+              <a16:creationId xmlns:a16="http://schemas.microsoft.com/office/drawing/2014/main" id="{889ECE38-421F-6080-A45C-C29916254390}"/>
+            </a:ext>
+          </a:extLst>
+        </p:cNvPr>
         <p:cNvGrpSpPr/>
         <p:nvPr/>
       </p:nvGrpSpPr>
@@ -4986,534 +5134,461 @@
           <a:chExt cx="0" cy="0"/>
         </a:xfrm>
       </p:grpSpPr>
-      <p:sp>
-        <p:nvSpPr>
-          <p:cNvPr id="2" name="Title 1">
-            <a:extLst>
-              <a:ext uri="{FF2B5EF4-FFF2-40B4-BE49-F238E27FC236}">
-                <a16:creationId xmlns:a16="http://schemas.microsoft.com/office/drawing/2014/main" id="{24E65BFE-2A4B-B88F-1227-0FABB188EFB1}"/>
-              </a:ext>
-            </a:extLst>
-          </p:cNvPr>
-          <p:cNvSpPr>
-            <a:spLocks noGrp="1"/>
-          </p:cNvSpPr>
-          <p:nvPr>
-            <p:ph type="title"/>
-          </p:nvPr>
-        </p:nvSpPr>
-        <p:spPr/>
-        <p:txBody>
-          <a:bodyPr/>
+      <p:pic>
+        <p:nvPicPr>
+          <p:cNvPr id="3" name="Picture 2">
+            <a:extLst>
+              <a:ext uri="{FF2B5EF4-FFF2-40B4-BE49-F238E27FC236}">
+                <a16:creationId xmlns:a16="http://schemas.microsoft.com/office/drawing/2014/main" id="{F0D4DAE7-F724-0F0D-53E3-F4FB87F35536}"/>
+              </a:ext>
+            </a:extLst>
+          </p:cNvPr>
+          <p:cNvPicPr>
+            <a:picLocks noChangeAspect="1"/>
+          </p:cNvPicPr>
+          <p:nvPr/>
+        </p:nvPicPr>
+        <p:blipFill>
+          <a:blip r:embed="rId2"/>
+          <a:srcRect t="1384" b="-1384"/>
+          <a:stretch/>
+        </p:blipFill>
+        <p:spPr>
+          <a:xfrm>
+            <a:off x="0" y="627368"/>
+            <a:ext cx="12192000" cy="5762799"/>
+          </a:xfrm>
+          <a:prstGeom prst="rect">
+            <a:avLst/>
+          </a:prstGeom>
+        </p:spPr>
+      </p:pic>
+      <p:sp>
+        <p:nvSpPr>
+          <p:cNvPr id="4" name="Rectangle 3">
+            <a:extLst>
+              <a:ext uri="{FF2B5EF4-FFF2-40B4-BE49-F238E27FC236}">
+                <a16:creationId xmlns:a16="http://schemas.microsoft.com/office/drawing/2014/main" id="{99F900A8-259E-6CFB-1B31-2B9D341CA73D}"/>
+              </a:ext>
+            </a:extLst>
+          </p:cNvPr>
+          <p:cNvSpPr/>
+          <p:nvPr/>
+        </p:nvSpPr>
+        <p:spPr>
+          <a:xfrm>
+            <a:off x="-63795" y="467833"/>
+            <a:ext cx="2232837" cy="5842566"/>
+          </a:xfrm>
+          <a:prstGeom prst="rect">
+            <a:avLst/>
+          </a:prstGeom>
+          <a:noFill/>
+          <a:ln w="38100" cap="flat" cmpd="sng" algn="ctr">
+            <a:solidFill>
+              <a:schemeClr val="accent2"/>
+            </a:solidFill>
+            <a:prstDash val="solid"/>
+            <a:round/>
+            <a:headEnd type="none" w="med" len="med"/>
+            <a:tailEnd type="none" w="med" len="med"/>
+          </a:ln>
+        </p:spPr>
+        <p:style>
+          <a:lnRef idx="0">
+            <a:scrgbClr r="0" g="0" b="0"/>
+          </a:lnRef>
+          <a:fillRef idx="0">
+            <a:scrgbClr r="0" g="0" b="0"/>
+          </a:fillRef>
+          <a:effectRef idx="0">
+            <a:scrgbClr r="0" g="0" b="0"/>
+          </a:effectRef>
+          <a:fontRef idx="minor">
+            <a:schemeClr val="accent4"/>
+          </a:fontRef>
+        </p:style>
+        <p:txBody>
+          <a:bodyPr rtlCol="0" anchor="ctr"/>
           <a:lstStyle/>
           <a:p>
+            <a:pPr algn="ctr"/>
             <a:endParaRPr lang="fr-FR"/>
           </a:p>
         </p:txBody>
       </p:sp>
       <p:sp>
         <p:nvSpPr>
-          <p:cNvPr id="3" name="Content Placeholder 2">
-            <a:extLst>
-              <a:ext uri="{FF2B5EF4-FFF2-40B4-BE49-F238E27FC236}">
-                <a16:creationId xmlns:a16="http://schemas.microsoft.com/office/drawing/2014/main" id="{AA824736-1B90-9585-AC26-6093B8A7D35E}"/>
-              </a:ext>
-            </a:extLst>
-          </p:cNvPr>
-          <p:cNvSpPr>
-            <a:spLocks noGrp="1"/>
-          </p:cNvSpPr>
-          <p:nvPr>
-            <p:ph idx="1"/>
-          </p:nvPr>
-        </p:nvSpPr>
-        <p:spPr/>
-        <p:txBody>
-          <a:bodyPr>
-            <a:normAutofit fontScale="85000" lnSpcReduction="20000"/>
-          </a:bodyPr>
+          <p:cNvPr id="6" name="Rectangle 5">
+            <a:extLst>
+              <a:ext uri="{FF2B5EF4-FFF2-40B4-BE49-F238E27FC236}">
+                <a16:creationId xmlns:a16="http://schemas.microsoft.com/office/drawing/2014/main" id="{9FA7BD92-E7F0-6290-4D0F-7B9C5B307335}"/>
+              </a:ext>
+            </a:extLst>
+          </p:cNvPr>
+          <p:cNvSpPr/>
+          <p:nvPr/>
+        </p:nvSpPr>
+        <p:spPr>
+          <a:xfrm>
+            <a:off x="2232837" y="467833"/>
+            <a:ext cx="9902456" cy="453655"/>
+          </a:xfrm>
+          <a:prstGeom prst="rect">
+            <a:avLst/>
+          </a:prstGeom>
+          <a:noFill/>
+          <a:ln w="38100" cap="flat" cmpd="sng" algn="ctr">
+            <a:solidFill>
+              <a:schemeClr val="accent5"/>
+            </a:solidFill>
+            <a:prstDash val="solid"/>
+            <a:round/>
+            <a:headEnd type="none" w="med" len="med"/>
+            <a:tailEnd type="none" w="med" len="med"/>
+          </a:ln>
+        </p:spPr>
+        <p:style>
+          <a:lnRef idx="0">
+            <a:scrgbClr r="0" g="0" b="0"/>
+          </a:lnRef>
+          <a:fillRef idx="0">
+            <a:scrgbClr r="0" g="0" b="0"/>
+          </a:fillRef>
+          <a:effectRef idx="0">
+            <a:scrgbClr r="0" g="0" b="0"/>
+          </a:effectRef>
+          <a:fontRef idx="minor">
+            <a:schemeClr val="accent4"/>
+          </a:fontRef>
+        </p:style>
+        <p:txBody>
+          <a:bodyPr rtlCol="0" anchor="ctr"/>
           <a:lstStyle/>
           <a:p>
-            <a:pPr algn="l">
-              <a:buFont typeface="+mj-lt"/>
-              <a:buAutoNum type="arabicPeriod"/>
-            </a:pPr>
-            <a:r>
-              <a:rPr lang="fr-FR" sz="1000" b="1" i="0" dirty="0">
-                <a:effectLst/>
-                <a:latin typeface="Segoe WPC"/>
-              </a:rPr>
-              <a:t>Interface Chat</a:t>
-            </a:r>
-            <a:r>
-              <a:rPr lang="fr-FR" sz="1000" b="0" i="0" dirty="0">
-                <a:effectLst/>
-                <a:latin typeface="Segoe WPC"/>
-              </a:rPr>
-              <a:t> :</a:t>
-            </a:r>
-          </a:p>
-          <a:p>
-            <a:pPr marL="742950" lvl="1" indent="-285750" algn="l">
-              <a:buFont typeface="+mj-lt"/>
-              <a:buAutoNum type="arabicPeriod"/>
-            </a:pPr>
-            <a:r>
-              <a:rPr lang="fr-FR" sz="900" b="0" i="0" dirty="0">
-                <a:effectLst/>
-                <a:latin typeface="Segoe WPC"/>
-              </a:rPr>
-              <a:t>Ajouter un système de "</a:t>
-            </a:r>
-            <a:r>
-              <a:rPr lang="fr-FR" sz="900" b="0" i="0" dirty="0" err="1">
-                <a:effectLst/>
-                <a:latin typeface="Segoe WPC"/>
-              </a:rPr>
-              <a:t>typing</a:t>
-            </a:r>
-            <a:r>
-              <a:rPr lang="fr-FR" sz="900" b="0" i="0" dirty="0">
-                <a:effectLst/>
-                <a:latin typeface="Segoe WPC"/>
-              </a:rPr>
-              <a:t> </a:t>
-            </a:r>
-            <a:r>
-              <a:rPr lang="fr-FR" sz="900" b="0" i="0" dirty="0" err="1">
-                <a:effectLst/>
-                <a:latin typeface="Segoe WPC"/>
-              </a:rPr>
-              <a:t>indicator</a:t>
-            </a:r>
-            <a:r>
-              <a:rPr lang="fr-FR" sz="900" b="0" i="0" dirty="0">
-                <a:effectLst/>
-                <a:latin typeface="Segoe WPC"/>
-              </a:rPr>
-              <a:t>" quand l'agent réfléchit</a:t>
-            </a:r>
-          </a:p>
-          <a:p>
-            <a:pPr marL="742950" lvl="1" indent="-285750" algn="l">
-              <a:buFont typeface="+mj-lt"/>
-              <a:buAutoNum type="arabicPeriod"/>
-            </a:pPr>
-            <a:r>
-              <a:rPr lang="fr-FR" sz="900" b="0" i="0" dirty="0">
-                <a:effectLst/>
-                <a:latin typeface="Segoe WPC"/>
-              </a:rPr>
-              <a:t>Permettre de copier facilement les commandes/résultats avec un bouton</a:t>
-            </a:r>
-          </a:p>
-          <a:p>
-            <a:pPr marL="742950" lvl="1" indent="-285750" algn="l">
-              <a:buFont typeface="+mj-lt"/>
-              <a:buAutoNum type="arabicPeriod"/>
-            </a:pPr>
-            <a:r>
-              <a:rPr lang="fr-FR" sz="900" b="0" i="0" dirty="0">
-                <a:effectLst/>
-                <a:latin typeface="Segoe WPC"/>
-              </a:rPr>
-              <a:t>Ajouter des bulles de chat stylisées (user vs agent)</a:t>
-            </a:r>
-          </a:p>
-          <a:p>
-            <a:pPr marL="742950" lvl="1" indent="-285750" algn="l">
-              <a:buFont typeface="+mj-lt"/>
-              <a:buAutoNum type="arabicPeriod"/>
-            </a:pPr>
-            <a:r>
-              <a:rPr lang="fr-FR" sz="900" b="0" i="0" dirty="0">
-                <a:effectLst/>
-                <a:latin typeface="Segoe WPC"/>
-              </a:rPr>
-              <a:t>Ajouter des avatars pour l'utilisateur et </a:t>
-            </a:r>
-            <a:r>
-              <a:rPr lang="fr-FR" sz="900" b="0" i="0" dirty="0" err="1">
-                <a:effectLst/>
-                <a:latin typeface="Segoe WPC"/>
-              </a:rPr>
-              <a:t>JarvisOne</a:t>
-            </a:r>
-            <a:endParaRPr lang="fr-FR" sz="900" b="0" i="0" dirty="0">
-              <a:effectLst/>
-              <a:latin typeface="Segoe WPC"/>
-            </a:endParaRPr>
-          </a:p>
-          <a:p>
-            <a:pPr marL="742950" lvl="1" indent="-285750" algn="l">
-              <a:buFont typeface="+mj-lt"/>
-              <a:buAutoNum type="arabicPeriod"/>
-            </a:pPr>
-            <a:r>
-              <a:rPr lang="fr-FR" sz="900" b="0" i="0" dirty="0">
-                <a:effectLst/>
-                <a:latin typeface="Segoe WPC"/>
-              </a:rPr>
-              <a:t>Permettre d'éditer les messages précédents</a:t>
-            </a:r>
-          </a:p>
-          <a:p>
-            <a:pPr algn="l">
-              <a:buFont typeface="+mj-lt"/>
-              <a:buAutoNum type="arabicPeriod"/>
-            </a:pPr>
-            <a:r>
-              <a:rPr lang="fr-FR" sz="1000" b="1" i="0" dirty="0">
-                <a:effectLst/>
-                <a:latin typeface="Segoe WPC"/>
-              </a:rPr>
-              <a:t>Logs et </a:t>
-            </a:r>
-            <a:r>
-              <a:rPr lang="fr-FR" sz="1000" b="1" i="0" dirty="0" err="1">
-                <a:effectLst/>
-                <a:latin typeface="Segoe WPC"/>
-              </a:rPr>
-              <a:t>Debug</a:t>
-            </a:r>
-            <a:r>
-              <a:rPr lang="fr-FR" sz="1000" b="0" i="0" dirty="0">
-                <a:effectLst/>
-                <a:latin typeface="Segoe WPC"/>
-              </a:rPr>
-              <a:t> :</a:t>
-            </a:r>
-          </a:p>
-          <a:p>
-            <a:pPr marL="742950" lvl="1" indent="-285750" algn="l">
-              <a:buFont typeface="+mj-lt"/>
-              <a:buAutoNum type="arabicPeriod"/>
-            </a:pPr>
-            <a:r>
-              <a:rPr lang="fr-FR" sz="900" b="0" i="0" dirty="0">
-                <a:effectLst/>
-                <a:latin typeface="Segoe WPC"/>
-              </a:rPr>
-              <a:t>Grouper les logs par conversation/requête</a:t>
-            </a:r>
-          </a:p>
-          <a:p>
-            <a:pPr marL="742950" lvl="1" indent="-285750" algn="l">
-              <a:buFont typeface="+mj-lt"/>
-              <a:buAutoNum type="arabicPeriod"/>
-            </a:pPr>
-            <a:r>
-              <a:rPr lang="fr-FR" sz="900" b="0" i="0" dirty="0">
-                <a:effectLst/>
-                <a:latin typeface="Segoe WPC"/>
-              </a:rPr>
-              <a:t>Ajouter des timestamps relatifs (il y a 2min) en plus des absolus</a:t>
-            </a:r>
-          </a:p>
-          <a:p>
-            <a:pPr marL="742950" lvl="1" indent="-285750" algn="l">
-              <a:buFont typeface="+mj-lt"/>
-              <a:buAutoNum type="arabicPeriod"/>
-            </a:pPr>
-            <a:r>
-              <a:rPr lang="fr-FR" sz="900" b="0" i="0" dirty="0">
-                <a:effectLst/>
-                <a:latin typeface="Segoe WPC"/>
-              </a:rPr>
-              <a:t>Colorer les logs par niveau mais plus subtilement</a:t>
-            </a:r>
-          </a:p>
-          <a:p>
-            <a:pPr marL="742950" lvl="1" indent="-285750" algn="l">
-              <a:buFont typeface="+mj-lt"/>
-              <a:buAutoNum type="arabicPeriod"/>
-            </a:pPr>
-            <a:r>
-              <a:rPr lang="fr-FR" sz="900" b="0" i="0" dirty="0">
-                <a:effectLst/>
-                <a:latin typeface="Segoe WPC"/>
-              </a:rPr>
-              <a:t>Ajouter des filtres par composant (UI, Agent, LLM, etc.)</a:t>
-            </a:r>
-          </a:p>
-          <a:p>
-            <a:pPr marL="742950" lvl="1" indent="-285750" algn="l">
-              <a:buFont typeface="+mj-lt"/>
-              <a:buAutoNum type="arabicPeriod"/>
-            </a:pPr>
-            <a:r>
-              <a:rPr lang="fr-FR" sz="900" b="0" i="0" dirty="0">
-                <a:effectLst/>
-                <a:latin typeface="Segoe WPC"/>
-              </a:rPr>
-              <a:t>Permettre de télécharger les logs</a:t>
-            </a:r>
-          </a:p>
-          <a:p>
-            <a:pPr algn="l">
-              <a:buFont typeface="+mj-lt"/>
-              <a:buAutoNum type="arabicPeriod"/>
-            </a:pPr>
-            <a:r>
-              <a:rPr lang="fr-FR" sz="1000" b="1" i="0" dirty="0">
-                <a:effectLst/>
-                <a:latin typeface="Segoe WPC"/>
-              </a:rPr>
-              <a:t>Configuration</a:t>
-            </a:r>
-            <a:r>
-              <a:rPr lang="fr-FR" sz="1000" b="0" i="0" dirty="0">
-                <a:effectLst/>
-                <a:latin typeface="Segoe WPC"/>
-              </a:rPr>
-              <a:t> :</a:t>
-            </a:r>
-          </a:p>
-          <a:p>
-            <a:pPr marL="742950" lvl="1" indent="-285750" algn="l">
-              <a:buFont typeface="+mj-lt"/>
-              <a:buAutoNum type="arabicPeriod"/>
-            </a:pPr>
-            <a:r>
-              <a:rPr lang="fr-FR" sz="900" b="0" i="0" dirty="0">
-                <a:effectLst/>
-                <a:latin typeface="Segoe WPC"/>
-              </a:rPr>
-              <a:t>Déplacer la config dans un modal/</a:t>
-            </a:r>
-            <a:r>
-              <a:rPr lang="fr-FR" sz="900" b="0" i="0" dirty="0" err="1">
-                <a:effectLst/>
-                <a:latin typeface="Segoe WPC"/>
-              </a:rPr>
-              <a:t>drawer</a:t>
-            </a:r>
-            <a:r>
-              <a:rPr lang="fr-FR" sz="900" b="0" i="0" dirty="0">
-                <a:effectLst/>
-                <a:latin typeface="Segoe WPC"/>
-              </a:rPr>
-              <a:t> au lieu de la sidebar</a:t>
-            </a:r>
-          </a:p>
-          <a:p>
-            <a:pPr marL="742950" lvl="1" indent="-285750" algn="l">
-              <a:buFont typeface="+mj-lt"/>
-              <a:buAutoNum type="arabicPeriod"/>
-            </a:pPr>
-            <a:r>
-              <a:rPr lang="fr-FR" sz="900" b="0" i="0" dirty="0">
-                <a:effectLst/>
-                <a:latin typeface="Segoe WPC"/>
-              </a:rPr>
-              <a:t>Ajouter des </a:t>
-            </a:r>
-            <a:r>
-              <a:rPr lang="fr-FR" sz="900" b="0" i="0" dirty="0" err="1">
-                <a:effectLst/>
-                <a:latin typeface="Segoe WPC"/>
-              </a:rPr>
-              <a:t>presets</a:t>
-            </a:r>
-            <a:r>
-              <a:rPr lang="fr-FR" sz="900" b="0" i="0" dirty="0">
-                <a:effectLst/>
-                <a:latin typeface="Segoe WPC"/>
-              </a:rPr>
-              <a:t> de configuration </a:t>
-            </a:r>
-            <a:r>
-              <a:rPr lang="fr-FR" sz="900" b="0" i="0" dirty="0" err="1">
-                <a:effectLst/>
-                <a:latin typeface="Segoe WPC"/>
-              </a:rPr>
-              <a:t>sauvegardables</a:t>
-            </a:r>
-            <a:endParaRPr lang="fr-FR" sz="900" b="0" i="0" dirty="0">
-              <a:effectLst/>
-              <a:latin typeface="Segoe WPC"/>
-            </a:endParaRPr>
-          </a:p>
-          <a:p>
-            <a:pPr marL="742950" lvl="1" indent="-285750" algn="l">
-              <a:buFont typeface="+mj-lt"/>
-              <a:buAutoNum type="arabicPeriod"/>
-            </a:pPr>
-            <a:r>
-              <a:rPr lang="fr-FR" sz="900" b="0" i="0" dirty="0">
-                <a:effectLst/>
-                <a:latin typeface="Segoe WPC"/>
-              </a:rPr>
-              <a:t>Ajouter une </a:t>
-            </a:r>
-            <a:r>
-              <a:rPr lang="fr-FR" sz="900" b="0" i="0" dirty="0" err="1">
-                <a:effectLst/>
-                <a:latin typeface="Segoe WPC"/>
-              </a:rPr>
-              <a:t>preview</a:t>
-            </a:r>
-            <a:r>
-              <a:rPr lang="fr-FR" sz="900" b="0" i="0" dirty="0">
-                <a:effectLst/>
-                <a:latin typeface="Segoe WPC"/>
-              </a:rPr>
-              <a:t> des capacités du modèle sélectionné</a:t>
-            </a:r>
-          </a:p>
-          <a:p>
-            <a:pPr marL="742950" lvl="1" indent="-285750" algn="l">
-              <a:buFont typeface="+mj-lt"/>
-              <a:buAutoNum type="arabicPeriod"/>
-            </a:pPr>
-            <a:r>
-              <a:rPr lang="fr-FR" sz="900" b="0" i="0" dirty="0">
-                <a:effectLst/>
-                <a:latin typeface="Segoe WPC"/>
-              </a:rPr>
-              <a:t>Permettre de tester la connexion API</a:t>
-            </a:r>
-          </a:p>
-          <a:p>
-            <a:pPr algn="l">
-              <a:buFont typeface="+mj-lt"/>
-              <a:buAutoNum type="arabicPeriod"/>
-            </a:pPr>
-            <a:r>
-              <a:rPr lang="fr-FR" sz="1000" b="1" i="0" dirty="0">
-                <a:effectLst/>
-                <a:latin typeface="Segoe WPC"/>
-              </a:rPr>
-              <a:t>Navigation</a:t>
-            </a:r>
-            <a:r>
-              <a:rPr lang="fr-FR" sz="1000" b="0" i="0" dirty="0">
-                <a:effectLst/>
-                <a:latin typeface="Segoe WPC"/>
-              </a:rPr>
-              <a:t> :</a:t>
-            </a:r>
-          </a:p>
-          <a:p>
-            <a:pPr marL="742950" lvl="1" indent="-285750" algn="l">
-              <a:buFont typeface="+mj-lt"/>
-              <a:buAutoNum type="arabicPeriod"/>
-            </a:pPr>
-            <a:r>
-              <a:rPr lang="fr-FR" sz="900" b="0" i="0" dirty="0">
-                <a:effectLst/>
-                <a:latin typeface="Segoe WPC"/>
-              </a:rPr>
-              <a:t>Ajouter un historique des conversations navigable</a:t>
-            </a:r>
-          </a:p>
-          <a:p>
-            <a:pPr marL="742950" lvl="1" indent="-285750" algn="l">
-              <a:buFont typeface="+mj-lt"/>
-              <a:buAutoNum type="arabicPeriod"/>
-            </a:pPr>
-            <a:r>
-              <a:rPr lang="fr-FR" sz="900" b="0" i="0" dirty="0">
-                <a:effectLst/>
-                <a:latin typeface="Segoe WPC"/>
-              </a:rPr>
-              <a:t>Permettre de sauvegarder des conversations favorites</a:t>
-            </a:r>
-          </a:p>
-          <a:p>
-            <a:pPr marL="742950" lvl="1" indent="-285750" algn="l">
-              <a:buFont typeface="+mj-lt"/>
-              <a:buAutoNum type="arabicPeriod"/>
-            </a:pPr>
-            <a:r>
-              <a:rPr lang="fr-FR" sz="900" b="0" i="0" dirty="0">
-                <a:effectLst/>
-                <a:latin typeface="Segoe WPC"/>
-              </a:rPr>
-              <a:t>Ajouter un système de tags/labels pour organiser les conversations</a:t>
-            </a:r>
-          </a:p>
-          <a:p>
-            <a:pPr algn="l">
-              <a:buFont typeface="+mj-lt"/>
-              <a:buAutoNum type="arabicPeriod"/>
-            </a:pPr>
-            <a:r>
-              <a:rPr lang="fr-FR" sz="1000" b="1" i="0" dirty="0">
-                <a:effectLst/>
-                <a:latin typeface="Segoe WPC"/>
-              </a:rPr>
-              <a:t>Thème et Style</a:t>
-            </a:r>
-            <a:r>
-              <a:rPr lang="fr-FR" sz="1000" b="0" i="0" dirty="0">
-                <a:effectLst/>
-                <a:latin typeface="Segoe WPC"/>
-              </a:rPr>
-              <a:t> :</a:t>
-            </a:r>
-          </a:p>
-          <a:p>
-            <a:pPr marL="742950" lvl="1" indent="-285750" algn="l">
-              <a:buFont typeface="+mj-lt"/>
-              <a:buAutoNum type="arabicPeriod"/>
-            </a:pPr>
-            <a:r>
-              <a:rPr lang="fr-FR" sz="900" b="0" i="0" dirty="0">
-                <a:effectLst/>
-                <a:latin typeface="Segoe WPC"/>
-              </a:rPr>
-              <a:t>Ajouter un thème sombre/clair</a:t>
-            </a:r>
-          </a:p>
-          <a:p>
-            <a:pPr marL="742950" lvl="1" indent="-285750" algn="l">
-              <a:buFont typeface="+mj-lt"/>
-              <a:buAutoNum type="arabicPeriod"/>
-            </a:pPr>
-            <a:r>
-              <a:rPr lang="fr-FR" sz="900" b="0" i="0" dirty="0">
-                <a:effectLst/>
-                <a:latin typeface="Segoe WPC"/>
-              </a:rPr>
-              <a:t>Permettre de personnaliser les couleurs</a:t>
-            </a:r>
-          </a:p>
-          <a:p>
-            <a:pPr marL="742950" lvl="1" indent="-285750" algn="l">
-              <a:buFont typeface="+mj-lt"/>
-              <a:buAutoNum type="arabicPeriod"/>
-            </a:pPr>
-            <a:r>
-              <a:rPr lang="fr-FR" sz="900" b="0" i="0" dirty="0">
-                <a:effectLst/>
-                <a:latin typeface="Segoe WPC"/>
-              </a:rPr>
-              <a:t>Ajouter des transitions/animations subtiles</a:t>
-            </a:r>
-          </a:p>
-          <a:p>
-            <a:pPr marL="742950" lvl="1" indent="-285750" algn="l">
-              <a:buFont typeface="+mj-lt"/>
-              <a:buAutoNum type="arabicPeriod"/>
-            </a:pPr>
-            <a:r>
-              <a:rPr lang="fr-FR" sz="900" b="0" i="0" dirty="0">
-                <a:effectLst/>
-                <a:latin typeface="Segoe WPC"/>
-              </a:rPr>
-              <a:t>Rendre l'interface plus responsive</a:t>
-            </a:r>
-          </a:p>
-          <a:p>
-            <a:endParaRPr lang="fr-FR" sz="1000" dirty="0"/>
+            <a:pPr algn="ctr"/>
+            <a:endParaRPr lang="fr-FR"/>
+          </a:p>
+        </p:txBody>
+      </p:sp>
+      <p:sp>
+        <p:nvSpPr>
+          <p:cNvPr id="7" name="Rectangle 6">
+            <a:extLst>
+              <a:ext uri="{FF2B5EF4-FFF2-40B4-BE49-F238E27FC236}">
+                <a16:creationId xmlns:a16="http://schemas.microsoft.com/office/drawing/2014/main" id="{397F4CD3-5C33-AEAC-117F-656B13CF2B2A}"/>
+              </a:ext>
+            </a:extLst>
+          </p:cNvPr>
+          <p:cNvSpPr/>
+          <p:nvPr/>
+        </p:nvSpPr>
+        <p:spPr>
+          <a:xfrm>
+            <a:off x="2229293" y="1001255"/>
+            <a:ext cx="5879805" cy="822293"/>
+          </a:xfrm>
+          <a:prstGeom prst="rect">
+            <a:avLst/>
+          </a:prstGeom>
+          <a:noFill/>
+          <a:ln w="38100" cap="flat" cmpd="sng" algn="ctr">
+            <a:solidFill>
+              <a:schemeClr val="accent4"/>
+            </a:solidFill>
+            <a:prstDash val="solid"/>
+            <a:round/>
+            <a:headEnd type="none" w="med" len="med"/>
+            <a:tailEnd type="none" w="med" len="med"/>
+          </a:ln>
+        </p:spPr>
+        <p:style>
+          <a:lnRef idx="0">
+            <a:scrgbClr r="0" g="0" b="0"/>
+          </a:lnRef>
+          <a:fillRef idx="0">
+            <a:scrgbClr r="0" g="0" b="0"/>
+          </a:fillRef>
+          <a:effectRef idx="0">
+            <a:scrgbClr r="0" g="0" b="0"/>
+          </a:effectRef>
+          <a:fontRef idx="minor">
+            <a:schemeClr val="accent4"/>
+          </a:fontRef>
+        </p:style>
+        <p:txBody>
+          <a:bodyPr rtlCol="0" anchor="ctr"/>
+          <a:lstStyle/>
+          <a:p>
+            <a:pPr algn="ctr"/>
+            <a:endParaRPr lang="fr-FR"/>
+          </a:p>
+        </p:txBody>
+      </p:sp>
+      <p:sp>
+        <p:nvSpPr>
+          <p:cNvPr id="8" name="Rectangle 7">
+            <a:extLst>
+              <a:ext uri="{FF2B5EF4-FFF2-40B4-BE49-F238E27FC236}">
+                <a16:creationId xmlns:a16="http://schemas.microsoft.com/office/drawing/2014/main" id="{C21EA842-2C5C-BDBD-4F72-001F0DB26279}"/>
+              </a:ext>
+            </a:extLst>
+          </p:cNvPr>
+          <p:cNvSpPr/>
+          <p:nvPr/>
+        </p:nvSpPr>
+        <p:spPr>
+          <a:xfrm>
+            <a:off x="2227521" y="1892595"/>
+            <a:ext cx="5879805" cy="3865788"/>
+          </a:xfrm>
+          <a:prstGeom prst="rect">
+            <a:avLst/>
+          </a:prstGeom>
+          <a:noFill/>
+          <a:ln w="38100">
+            <a:headEnd type="none" w="med" len="med"/>
+            <a:tailEnd type="none" w="med" len="med"/>
+          </a:ln>
+        </p:spPr>
+        <p:style>
+          <a:lnRef idx="2">
+            <a:schemeClr val="accent6"/>
+          </a:lnRef>
+          <a:fillRef idx="1">
+            <a:schemeClr val="lt1"/>
+          </a:fillRef>
+          <a:effectRef idx="0">
+            <a:schemeClr val="accent6"/>
+          </a:effectRef>
+          <a:fontRef idx="minor">
+            <a:schemeClr val="dk1"/>
+          </a:fontRef>
+        </p:style>
+        <p:txBody>
+          <a:bodyPr rtlCol="0" anchor="ctr"/>
+          <a:lstStyle/>
+          <a:p>
+            <a:pPr algn="ctr"/>
+            <a:endParaRPr lang="fr-FR"/>
+          </a:p>
+        </p:txBody>
+      </p:sp>
+      <p:sp>
+        <p:nvSpPr>
+          <p:cNvPr id="9" name="Rectangle 8">
+            <a:extLst>
+              <a:ext uri="{FF2B5EF4-FFF2-40B4-BE49-F238E27FC236}">
+                <a16:creationId xmlns:a16="http://schemas.microsoft.com/office/drawing/2014/main" id="{FF020E96-F338-9584-17C9-62C95EFABA6C}"/>
+              </a:ext>
+            </a:extLst>
+          </p:cNvPr>
+          <p:cNvSpPr/>
+          <p:nvPr/>
+        </p:nvSpPr>
+        <p:spPr>
+          <a:xfrm>
+            <a:off x="2229293" y="5867465"/>
+            <a:ext cx="5879805" cy="453655"/>
+          </a:xfrm>
+          <a:prstGeom prst="rect">
+            <a:avLst/>
+          </a:prstGeom>
+          <a:noFill/>
+          <a:ln w="38100" cap="flat" cmpd="sng" algn="ctr">
+            <a:solidFill>
+              <a:schemeClr val="accent4"/>
+            </a:solidFill>
+            <a:prstDash val="solid"/>
+            <a:round/>
+            <a:headEnd type="none" w="med" len="med"/>
+            <a:tailEnd type="none" w="med" len="med"/>
+          </a:ln>
+        </p:spPr>
+        <p:style>
+          <a:lnRef idx="0">
+            <a:scrgbClr r="0" g="0" b="0"/>
+          </a:lnRef>
+          <a:fillRef idx="0">
+            <a:scrgbClr r="0" g="0" b="0"/>
+          </a:fillRef>
+          <a:effectRef idx="0">
+            <a:scrgbClr r="0" g="0" b="0"/>
+          </a:effectRef>
+          <a:fontRef idx="minor">
+            <a:schemeClr val="accent4"/>
+          </a:fontRef>
+        </p:style>
+        <p:txBody>
+          <a:bodyPr rtlCol="0" anchor="ctr"/>
+          <a:lstStyle/>
+          <a:p>
+            <a:pPr algn="ctr"/>
+            <a:endParaRPr lang="fr-FR"/>
+          </a:p>
+        </p:txBody>
+      </p:sp>
+      <p:sp>
+        <p:nvSpPr>
+          <p:cNvPr id="10" name="Rectangle 9">
+            <a:extLst>
+              <a:ext uri="{FF2B5EF4-FFF2-40B4-BE49-F238E27FC236}">
+                <a16:creationId xmlns:a16="http://schemas.microsoft.com/office/drawing/2014/main" id="{3BA9F368-785B-CCB9-7EB2-4FD8C199ED0B}"/>
+              </a:ext>
+            </a:extLst>
+          </p:cNvPr>
+          <p:cNvSpPr/>
+          <p:nvPr/>
+        </p:nvSpPr>
+        <p:spPr>
+          <a:xfrm>
+            <a:off x="8236688" y="1001256"/>
+            <a:ext cx="3898605" cy="359712"/>
+          </a:xfrm>
+          <a:prstGeom prst="rect">
+            <a:avLst/>
+          </a:prstGeom>
+          <a:noFill/>
+          <a:ln w="38100" cap="flat" cmpd="sng" algn="ctr">
+            <a:solidFill>
+              <a:schemeClr val="accent4"/>
+            </a:solidFill>
+            <a:prstDash val="solid"/>
+            <a:round/>
+            <a:headEnd type="none" w="med" len="med"/>
+            <a:tailEnd type="none" w="med" len="med"/>
+          </a:ln>
+        </p:spPr>
+        <p:style>
+          <a:lnRef idx="0">
+            <a:scrgbClr r="0" g="0" b="0"/>
+          </a:lnRef>
+          <a:fillRef idx="0">
+            <a:scrgbClr r="0" g="0" b="0"/>
+          </a:fillRef>
+          <a:effectRef idx="0">
+            <a:scrgbClr r="0" g="0" b="0"/>
+          </a:effectRef>
+          <a:fontRef idx="minor">
+            <a:schemeClr val="accent4"/>
+          </a:fontRef>
+        </p:style>
+        <p:txBody>
+          <a:bodyPr rtlCol="0" anchor="ctr"/>
+          <a:lstStyle/>
+          <a:p>
+            <a:pPr algn="ctr"/>
+            <a:endParaRPr lang="fr-FR"/>
+          </a:p>
+        </p:txBody>
+      </p:sp>
+      <p:sp>
+        <p:nvSpPr>
+          <p:cNvPr id="11" name="Rectangle 10">
+            <a:extLst>
+              <a:ext uri="{FF2B5EF4-FFF2-40B4-BE49-F238E27FC236}">
+                <a16:creationId xmlns:a16="http://schemas.microsoft.com/office/drawing/2014/main" id="{EFD106CA-73F4-ECED-81AB-32941B4DF23A}"/>
+              </a:ext>
+            </a:extLst>
+          </p:cNvPr>
+          <p:cNvSpPr/>
+          <p:nvPr/>
+        </p:nvSpPr>
+        <p:spPr>
+          <a:xfrm>
+            <a:off x="8234916" y="1440736"/>
+            <a:ext cx="3898605" cy="4317647"/>
+          </a:xfrm>
+          <a:prstGeom prst="rect">
+            <a:avLst/>
+          </a:prstGeom>
+          <a:noFill/>
+          <a:ln w="38100">
+            <a:headEnd type="none" w="med" len="med"/>
+            <a:tailEnd type="none" w="med" len="med"/>
+          </a:ln>
+        </p:spPr>
+        <p:style>
+          <a:lnRef idx="2">
+            <a:schemeClr val="accent6"/>
+          </a:lnRef>
+          <a:fillRef idx="1">
+            <a:schemeClr val="lt1"/>
+          </a:fillRef>
+          <a:effectRef idx="0">
+            <a:schemeClr val="accent6"/>
+          </a:effectRef>
+          <a:fontRef idx="minor">
+            <a:schemeClr val="dk1"/>
+          </a:fontRef>
+        </p:style>
+        <p:txBody>
+          <a:bodyPr rtlCol="0" anchor="ctr"/>
+          <a:lstStyle/>
+          <a:p>
+            <a:pPr algn="ctr"/>
+            <a:endParaRPr lang="fr-FR"/>
+          </a:p>
+        </p:txBody>
+      </p:sp>
+      <p:sp>
+        <p:nvSpPr>
+          <p:cNvPr id="12" name="Rectangle 11">
+            <a:extLst>
+              <a:ext uri="{FF2B5EF4-FFF2-40B4-BE49-F238E27FC236}">
+                <a16:creationId xmlns:a16="http://schemas.microsoft.com/office/drawing/2014/main" id="{25A223D5-C263-4DE2-A58D-F3E705036FC3}"/>
+              </a:ext>
+            </a:extLst>
+          </p:cNvPr>
+          <p:cNvSpPr/>
+          <p:nvPr/>
+        </p:nvSpPr>
+        <p:spPr>
+          <a:xfrm>
+            <a:off x="8236688" y="5867465"/>
+            <a:ext cx="3898605" cy="453655"/>
+          </a:xfrm>
+          <a:prstGeom prst="rect">
+            <a:avLst/>
+          </a:prstGeom>
+          <a:noFill/>
+          <a:ln w="38100" cap="flat" cmpd="sng" algn="ctr">
+            <a:solidFill>
+              <a:schemeClr val="accent4"/>
+            </a:solidFill>
+            <a:prstDash val="solid"/>
+            <a:round/>
+            <a:headEnd type="none" w="med" len="med"/>
+            <a:tailEnd type="none" w="med" len="med"/>
+          </a:ln>
+        </p:spPr>
+        <p:style>
+          <a:lnRef idx="0">
+            <a:scrgbClr r="0" g="0" b="0"/>
+          </a:lnRef>
+          <a:fillRef idx="0">
+            <a:scrgbClr r="0" g="0" b="0"/>
+          </a:fillRef>
+          <a:effectRef idx="0">
+            <a:scrgbClr r="0" g="0" b="0"/>
+          </a:effectRef>
+          <a:fontRef idx="minor">
+            <a:schemeClr val="accent4"/>
+          </a:fontRef>
+        </p:style>
+        <p:txBody>
+          <a:bodyPr rtlCol="0" anchor="ctr"/>
+          <a:lstStyle/>
+          <a:p>
+            <a:pPr algn="ctr"/>
+            <a:endParaRPr lang="fr-FR"/>
           </a:p>
         </p:txBody>
       </p:sp>
     </p:spTree>
     <p:extLst>
       <p:ext uri="{BB962C8B-B14F-4D97-AF65-F5344CB8AC3E}">
-        <p14:creationId xmlns:p14="http://schemas.microsoft.com/office/powerpoint/2010/main" val="479488143"/>
+        <p14:creationId xmlns:p14="http://schemas.microsoft.com/office/powerpoint/2010/main" val="1183068327"/>
       </p:ext>
     </p:extLst>
   </p:cSld>
@@ -5540,6 +5615,560 @@
           <a:chExt cx="0" cy="0"/>
         </a:xfrm>
       </p:grpSpPr>
+      <p:sp>
+        <p:nvSpPr>
+          <p:cNvPr id="2" name="Title 1">
+            <a:extLst>
+              <a:ext uri="{FF2B5EF4-FFF2-40B4-BE49-F238E27FC236}">
+                <a16:creationId xmlns:a16="http://schemas.microsoft.com/office/drawing/2014/main" id="{24E65BFE-2A4B-B88F-1227-0FABB188EFB1}"/>
+              </a:ext>
+            </a:extLst>
+          </p:cNvPr>
+          <p:cNvSpPr>
+            <a:spLocks noGrp="1"/>
+          </p:cNvSpPr>
+          <p:nvPr>
+            <p:ph type="title"/>
+          </p:nvPr>
+        </p:nvSpPr>
+        <p:spPr/>
+        <p:txBody>
+          <a:bodyPr/>
+          <a:lstStyle/>
+          <a:p>
+            <a:endParaRPr lang="fr-FR"/>
+          </a:p>
+        </p:txBody>
+      </p:sp>
+      <p:sp>
+        <p:nvSpPr>
+          <p:cNvPr id="3" name="Content Placeholder 2">
+            <a:extLst>
+              <a:ext uri="{FF2B5EF4-FFF2-40B4-BE49-F238E27FC236}">
+                <a16:creationId xmlns:a16="http://schemas.microsoft.com/office/drawing/2014/main" id="{AA824736-1B90-9585-AC26-6093B8A7D35E}"/>
+              </a:ext>
+            </a:extLst>
+          </p:cNvPr>
+          <p:cNvSpPr>
+            <a:spLocks noGrp="1"/>
+          </p:cNvSpPr>
+          <p:nvPr>
+            <p:ph idx="1"/>
+          </p:nvPr>
+        </p:nvSpPr>
+        <p:spPr/>
+        <p:txBody>
+          <a:bodyPr>
+            <a:normAutofit fontScale="85000" lnSpcReduction="20000"/>
+          </a:bodyPr>
+          <a:lstStyle/>
+          <a:p>
+            <a:pPr algn="l">
+              <a:buFont typeface="+mj-lt"/>
+              <a:buAutoNum type="arabicPeriod"/>
+            </a:pPr>
+            <a:r>
+              <a:rPr lang="fr-FR" sz="1000" b="1" i="0" dirty="0">
+                <a:effectLst/>
+                <a:latin typeface="Segoe WPC"/>
+              </a:rPr>
+              <a:t>Interface Chat</a:t>
+            </a:r>
+            <a:r>
+              <a:rPr lang="fr-FR" sz="1000" b="0" i="0" dirty="0">
+                <a:effectLst/>
+                <a:latin typeface="Segoe WPC"/>
+              </a:rPr>
+              <a:t> :</a:t>
+            </a:r>
+          </a:p>
+          <a:p>
+            <a:pPr marL="742950" lvl="1" indent="-285750" algn="l">
+              <a:buFont typeface="+mj-lt"/>
+              <a:buAutoNum type="arabicPeriod"/>
+            </a:pPr>
+            <a:r>
+              <a:rPr lang="fr-FR" sz="900" b="0" i="0" dirty="0">
+                <a:effectLst/>
+                <a:latin typeface="Segoe WPC"/>
+              </a:rPr>
+              <a:t>Ajouter un système de "</a:t>
+            </a:r>
+            <a:r>
+              <a:rPr lang="fr-FR" sz="900" b="0" i="0" dirty="0" err="1">
+                <a:effectLst/>
+                <a:latin typeface="Segoe WPC"/>
+              </a:rPr>
+              <a:t>typing</a:t>
+            </a:r>
+            <a:r>
+              <a:rPr lang="fr-FR" sz="900" b="0" i="0" dirty="0">
+                <a:effectLst/>
+                <a:latin typeface="Segoe WPC"/>
+              </a:rPr>
+              <a:t> </a:t>
+            </a:r>
+            <a:r>
+              <a:rPr lang="fr-FR" sz="900" b="0" i="0" dirty="0" err="1">
+                <a:effectLst/>
+                <a:latin typeface="Segoe WPC"/>
+              </a:rPr>
+              <a:t>indicator</a:t>
+            </a:r>
+            <a:r>
+              <a:rPr lang="fr-FR" sz="900" b="0" i="0" dirty="0">
+                <a:effectLst/>
+                <a:latin typeface="Segoe WPC"/>
+              </a:rPr>
+              <a:t>" quand l'agent réfléchit</a:t>
+            </a:r>
+          </a:p>
+          <a:p>
+            <a:pPr marL="742950" lvl="1" indent="-285750" algn="l">
+              <a:buFont typeface="+mj-lt"/>
+              <a:buAutoNum type="arabicPeriod"/>
+            </a:pPr>
+            <a:r>
+              <a:rPr lang="fr-FR" sz="900" b="0" i="0" dirty="0">
+                <a:effectLst/>
+                <a:latin typeface="Segoe WPC"/>
+              </a:rPr>
+              <a:t>Permettre de copier facilement les commandes/résultats avec un bouton</a:t>
+            </a:r>
+          </a:p>
+          <a:p>
+            <a:pPr marL="742950" lvl="1" indent="-285750" algn="l">
+              <a:buFont typeface="+mj-lt"/>
+              <a:buAutoNum type="arabicPeriod"/>
+            </a:pPr>
+            <a:r>
+              <a:rPr lang="fr-FR" sz="900" b="0" i="0" dirty="0">
+                <a:effectLst/>
+                <a:latin typeface="Segoe WPC"/>
+              </a:rPr>
+              <a:t>Ajouter des bulles de chat stylisées (user vs agent)</a:t>
+            </a:r>
+          </a:p>
+          <a:p>
+            <a:pPr marL="742950" lvl="1" indent="-285750" algn="l">
+              <a:buFont typeface="+mj-lt"/>
+              <a:buAutoNum type="arabicPeriod"/>
+            </a:pPr>
+            <a:r>
+              <a:rPr lang="fr-FR" sz="900" b="0" i="0" dirty="0">
+                <a:effectLst/>
+                <a:latin typeface="Segoe WPC"/>
+              </a:rPr>
+              <a:t>Ajouter des avatars pour l'utilisateur et </a:t>
+            </a:r>
+            <a:r>
+              <a:rPr lang="fr-FR" sz="900" b="0" i="0" dirty="0" err="1">
+                <a:effectLst/>
+                <a:latin typeface="Segoe WPC"/>
+              </a:rPr>
+              <a:t>JarvisOne</a:t>
+            </a:r>
+            <a:endParaRPr lang="fr-FR" sz="900" b="0" i="0" dirty="0">
+              <a:effectLst/>
+              <a:latin typeface="Segoe WPC"/>
+            </a:endParaRPr>
+          </a:p>
+          <a:p>
+            <a:pPr marL="742950" lvl="1" indent="-285750" algn="l">
+              <a:buFont typeface="+mj-lt"/>
+              <a:buAutoNum type="arabicPeriod"/>
+            </a:pPr>
+            <a:r>
+              <a:rPr lang="fr-FR" sz="900" b="0" i="0" dirty="0">
+                <a:effectLst/>
+                <a:latin typeface="Segoe WPC"/>
+              </a:rPr>
+              <a:t>Permettre d'éditer les messages précédents</a:t>
+            </a:r>
+          </a:p>
+          <a:p>
+            <a:pPr algn="l">
+              <a:buFont typeface="+mj-lt"/>
+              <a:buAutoNum type="arabicPeriod"/>
+            </a:pPr>
+            <a:r>
+              <a:rPr lang="fr-FR" sz="1000" b="1" i="0" dirty="0">
+                <a:effectLst/>
+                <a:latin typeface="Segoe WPC"/>
+              </a:rPr>
+              <a:t>Logs et </a:t>
+            </a:r>
+            <a:r>
+              <a:rPr lang="fr-FR" sz="1000" b="1" i="0" dirty="0" err="1">
+                <a:effectLst/>
+                <a:latin typeface="Segoe WPC"/>
+              </a:rPr>
+              <a:t>Debug</a:t>
+            </a:r>
+            <a:r>
+              <a:rPr lang="fr-FR" sz="1000" b="0" i="0" dirty="0">
+                <a:effectLst/>
+                <a:latin typeface="Segoe WPC"/>
+              </a:rPr>
+              <a:t> :</a:t>
+            </a:r>
+          </a:p>
+          <a:p>
+            <a:pPr marL="742950" lvl="1" indent="-285750" algn="l">
+              <a:buFont typeface="+mj-lt"/>
+              <a:buAutoNum type="arabicPeriod"/>
+            </a:pPr>
+            <a:r>
+              <a:rPr lang="fr-FR" sz="900" b="0" i="0" dirty="0">
+                <a:effectLst/>
+                <a:latin typeface="Segoe WPC"/>
+              </a:rPr>
+              <a:t>Grouper les logs par conversation/requête</a:t>
+            </a:r>
+          </a:p>
+          <a:p>
+            <a:pPr marL="742950" lvl="1" indent="-285750" algn="l">
+              <a:buFont typeface="+mj-lt"/>
+              <a:buAutoNum type="arabicPeriod"/>
+            </a:pPr>
+            <a:r>
+              <a:rPr lang="fr-FR" sz="900" b="0" i="0" dirty="0">
+                <a:effectLst/>
+                <a:latin typeface="Segoe WPC"/>
+              </a:rPr>
+              <a:t>Ajouter des timestamps relatifs (il y a 2min) en plus des absolus</a:t>
+            </a:r>
+          </a:p>
+          <a:p>
+            <a:pPr marL="742950" lvl="1" indent="-285750" algn="l">
+              <a:buFont typeface="+mj-lt"/>
+              <a:buAutoNum type="arabicPeriod"/>
+            </a:pPr>
+            <a:r>
+              <a:rPr lang="fr-FR" sz="900" b="0" i="0" dirty="0">
+                <a:effectLst/>
+                <a:latin typeface="Segoe WPC"/>
+              </a:rPr>
+              <a:t>Colorer les logs par niveau mais plus subtilement</a:t>
+            </a:r>
+          </a:p>
+          <a:p>
+            <a:pPr marL="742950" lvl="1" indent="-285750" algn="l">
+              <a:buFont typeface="+mj-lt"/>
+              <a:buAutoNum type="arabicPeriod"/>
+            </a:pPr>
+            <a:r>
+              <a:rPr lang="fr-FR" sz="900" b="0" i="0" dirty="0">
+                <a:effectLst/>
+                <a:latin typeface="Segoe WPC"/>
+              </a:rPr>
+              <a:t>Ajouter des filtres par composant (UI, Agent, LLM, etc.)</a:t>
+            </a:r>
+          </a:p>
+          <a:p>
+            <a:pPr marL="742950" lvl="1" indent="-285750" algn="l">
+              <a:buFont typeface="+mj-lt"/>
+              <a:buAutoNum type="arabicPeriod"/>
+            </a:pPr>
+            <a:r>
+              <a:rPr lang="fr-FR" sz="900" b="0" i="0" dirty="0">
+                <a:effectLst/>
+                <a:latin typeface="Segoe WPC"/>
+              </a:rPr>
+              <a:t>Permettre de télécharger les logs</a:t>
+            </a:r>
+          </a:p>
+          <a:p>
+            <a:pPr algn="l">
+              <a:buFont typeface="+mj-lt"/>
+              <a:buAutoNum type="arabicPeriod"/>
+            </a:pPr>
+            <a:r>
+              <a:rPr lang="fr-FR" sz="1000" b="1" i="0" dirty="0">
+                <a:effectLst/>
+                <a:latin typeface="Segoe WPC"/>
+              </a:rPr>
+              <a:t>Configuration</a:t>
+            </a:r>
+            <a:r>
+              <a:rPr lang="fr-FR" sz="1000" b="0" i="0" dirty="0">
+                <a:effectLst/>
+                <a:latin typeface="Segoe WPC"/>
+              </a:rPr>
+              <a:t> :</a:t>
+            </a:r>
+          </a:p>
+          <a:p>
+            <a:pPr marL="742950" lvl="1" indent="-285750" algn="l">
+              <a:buFont typeface="+mj-lt"/>
+              <a:buAutoNum type="arabicPeriod"/>
+            </a:pPr>
+            <a:r>
+              <a:rPr lang="fr-FR" sz="900" b="0" i="0" dirty="0">
+                <a:effectLst/>
+                <a:latin typeface="Segoe WPC"/>
+              </a:rPr>
+              <a:t>Déplacer la config dans un modal/</a:t>
+            </a:r>
+            <a:r>
+              <a:rPr lang="fr-FR" sz="900" b="0" i="0" dirty="0" err="1">
+                <a:effectLst/>
+                <a:latin typeface="Segoe WPC"/>
+              </a:rPr>
+              <a:t>drawer</a:t>
+            </a:r>
+            <a:r>
+              <a:rPr lang="fr-FR" sz="900" b="0" i="0" dirty="0">
+                <a:effectLst/>
+                <a:latin typeface="Segoe WPC"/>
+              </a:rPr>
+              <a:t> au lieu de la sidebar</a:t>
+            </a:r>
+          </a:p>
+          <a:p>
+            <a:pPr marL="742950" lvl="1" indent="-285750" algn="l">
+              <a:buFont typeface="+mj-lt"/>
+              <a:buAutoNum type="arabicPeriod"/>
+            </a:pPr>
+            <a:r>
+              <a:rPr lang="fr-FR" sz="900" b="0" i="0" dirty="0">
+                <a:effectLst/>
+                <a:latin typeface="Segoe WPC"/>
+              </a:rPr>
+              <a:t>Ajouter des </a:t>
+            </a:r>
+            <a:r>
+              <a:rPr lang="fr-FR" sz="900" b="0" i="0" dirty="0" err="1">
+                <a:effectLst/>
+                <a:latin typeface="Segoe WPC"/>
+              </a:rPr>
+              <a:t>presets</a:t>
+            </a:r>
+            <a:r>
+              <a:rPr lang="fr-FR" sz="900" b="0" i="0" dirty="0">
+                <a:effectLst/>
+                <a:latin typeface="Segoe WPC"/>
+              </a:rPr>
+              <a:t> de configuration </a:t>
+            </a:r>
+            <a:r>
+              <a:rPr lang="fr-FR" sz="900" b="0" i="0" dirty="0" err="1">
+                <a:effectLst/>
+                <a:latin typeface="Segoe WPC"/>
+              </a:rPr>
+              <a:t>sauvegardables</a:t>
+            </a:r>
+            <a:endParaRPr lang="fr-FR" sz="900" b="0" i="0" dirty="0">
+              <a:effectLst/>
+              <a:latin typeface="Segoe WPC"/>
+            </a:endParaRPr>
+          </a:p>
+          <a:p>
+            <a:pPr marL="742950" lvl="1" indent="-285750" algn="l">
+              <a:buFont typeface="+mj-lt"/>
+              <a:buAutoNum type="arabicPeriod"/>
+            </a:pPr>
+            <a:r>
+              <a:rPr lang="fr-FR" sz="900" b="0" i="0" dirty="0">
+                <a:effectLst/>
+                <a:latin typeface="Segoe WPC"/>
+              </a:rPr>
+              <a:t>Ajouter une </a:t>
+            </a:r>
+            <a:r>
+              <a:rPr lang="fr-FR" sz="900" b="0" i="0" dirty="0" err="1">
+                <a:effectLst/>
+                <a:latin typeface="Segoe WPC"/>
+              </a:rPr>
+              <a:t>preview</a:t>
+            </a:r>
+            <a:r>
+              <a:rPr lang="fr-FR" sz="900" b="0" i="0" dirty="0">
+                <a:effectLst/>
+                <a:latin typeface="Segoe WPC"/>
+              </a:rPr>
+              <a:t> des capacités du modèle sélectionné</a:t>
+            </a:r>
+          </a:p>
+          <a:p>
+            <a:pPr marL="742950" lvl="1" indent="-285750" algn="l">
+              <a:buFont typeface="+mj-lt"/>
+              <a:buAutoNum type="arabicPeriod"/>
+            </a:pPr>
+            <a:r>
+              <a:rPr lang="fr-FR" sz="900" b="0" i="0" dirty="0">
+                <a:effectLst/>
+                <a:latin typeface="Segoe WPC"/>
+              </a:rPr>
+              <a:t>Permettre de tester la connexion API</a:t>
+            </a:r>
+          </a:p>
+          <a:p>
+            <a:pPr algn="l">
+              <a:buFont typeface="+mj-lt"/>
+              <a:buAutoNum type="arabicPeriod"/>
+            </a:pPr>
+            <a:r>
+              <a:rPr lang="fr-FR" sz="1000" b="1" i="0" dirty="0">
+                <a:effectLst/>
+                <a:latin typeface="Segoe WPC"/>
+              </a:rPr>
+              <a:t>Navigation</a:t>
+            </a:r>
+            <a:r>
+              <a:rPr lang="fr-FR" sz="1000" b="0" i="0" dirty="0">
+                <a:effectLst/>
+                <a:latin typeface="Segoe WPC"/>
+              </a:rPr>
+              <a:t> :</a:t>
+            </a:r>
+          </a:p>
+          <a:p>
+            <a:pPr marL="742950" lvl="1" indent="-285750" algn="l">
+              <a:buFont typeface="+mj-lt"/>
+              <a:buAutoNum type="arabicPeriod"/>
+            </a:pPr>
+            <a:r>
+              <a:rPr lang="fr-FR" sz="900" b="0" i="0" dirty="0">
+                <a:effectLst/>
+                <a:latin typeface="Segoe WPC"/>
+              </a:rPr>
+              <a:t>Ajouter un historique des conversations navigable</a:t>
+            </a:r>
+          </a:p>
+          <a:p>
+            <a:pPr marL="742950" lvl="1" indent="-285750" algn="l">
+              <a:buFont typeface="+mj-lt"/>
+              <a:buAutoNum type="arabicPeriod"/>
+            </a:pPr>
+            <a:r>
+              <a:rPr lang="fr-FR" sz="900" b="0" i="0" dirty="0">
+                <a:effectLst/>
+                <a:latin typeface="Segoe WPC"/>
+              </a:rPr>
+              <a:t>Permettre de sauvegarder des conversations favorites</a:t>
+            </a:r>
+          </a:p>
+          <a:p>
+            <a:pPr marL="742950" lvl="1" indent="-285750" algn="l">
+              <a:buFont typeface="+mj-lt"/>
+              <a:buAutoNum type="arabicPeriod"/>
+            </a:pPr>
+            <a:r>
+              <a:rPr lang="fr-FR" sz="900" b="0" i="0" dirty="0">
+                <a:effectLst/>
+                <a:latin typeface="Segoe WPC"/>
+              </a:rPr>
+              <a:t>Ajouter un système de tags/labels pour organiser les conversations</a:t>
+            </a:r>
+          </a:p>
+          <a:p>
+            <a:pPr algn="l">
+              <a:buFont typeface="+mj-lt"/>
+              <a:buAutoNum type="arabicPeriod"/>
+            </a:pPr>
+            <a:r>
+              <a:rPr lang="fr-FR" sz="1000" b="1" i="0" dirty="0">
+                <a:effectLst/>
+                <a:latin typeface="Segoe WPC"/>
+              </a:rPr>
+              <a:t>Thème et Style</a:t>
+            </a:r>
+            <a:r>
+              <a:rPr lang="fr-FR" sz="1000" b="0" i="0" dirty="0">
+                <a:effectLst/>
+                <a:latin typeface="Segoe WPC"/>
+              </a:rPr>
+              <a:t> :</a:t>
+            </a:r>
+          </a:p>
+          <a:p>
+            <a:pPr marL="742950" lvl="1" indent="-285750" algn="l">
+              <a:buFont typeface="+mj-lt"/>
+              <a:buAutoNum type="arabicPeriod"/>
+            </a:pPr>
+            <a:r>
+              <a:rPr lang="fr-FR" sz="900" b="0" i="0" dirty="0">
+                <a:effectLst/>
+                <a:latin typeface="Segoe WPC"/>
+              </a:rPr>
+              <a:t>Ajouter un thème sombre/clair</a:t>
+            </a:r>
+          </a:p>
+          <a:p>
+            <a:pPr marL="742950" lvl="1" indent="-285750" algn="l">
+              <a:buFont typeface="+mj-lt"/>
+              <a:buAutoNum type="arabicPeriod"/>
+            </a:pPr>
+            <a:r>
+              <a:rPr lang="fr-FR" sz="900" b="0" i="0" dirty="0">
+                <a:effectLst/>
+                <a:latin typeface="Segoe WPC"/>
+              </a:rPr>
+              <a:t>Permettre de personnaliser les couleurs</a:t>
+            </a:r>
+          </a:p>
+          <a:p>
+            <a:pPr marL="742950" lvl="1" indent="-285750" algn="l">
+              <a:buFont typeface="+mj-lt"/>
+              <a:buAutoNum type="arabicPeriod"/>
+            </a:pPr>
+            <a:r>
+              <a:rPr lang="fr-FR" sz="900" b="0" i="0" dirty="0">
+                <a:effectLst/>
+                <a:latin typeface="Segoe WPC"/>
+              </a:rPr>
+              <a:t>Ajouter des transitions/animations subtiles</a:t>
+            </a:r>
+          </a:p>
+          <a:p>
+            <a:pPr marL="742950" lvl="1" indent="-285750" algn="l">
+              <a:buFont typeface="+mj-lt"/>
+              <a:buAutoNum type="arabicPeriod"/>
+            </a:pPr>
+            <a:r>
+              <a:rPr lang="fr-FR" sz="900" b="0" i="0" dirty="0">
+                <a:effectLst/>
+                <a:latin typeface="Segoe WPC"/>
+              </a:rPr>
+              <a:t>Rendre l'interface plus responsive</a:t>
+            </a:r>
+          </a:p>
+          <a:p>
+            <a:endParaRPr lang="fr-FR" sz="1000" dirty="0"/>
+          </a:p>
+        </p:txBody>
+      </p:sp>
+    </p:spTree>
+    <p:extLst>
+      <p:ext uri="{BB962C8B-B14F-4D97-AF65-F5344CB8AC3E}">
+        <p14:creationId xmlns:p14="http://schemas.microsoft.com/office/powerpoint/2010/main" val="479488143"/>
+      </p:ext>
+    </p:extLst>
+  </p:cSld>
+  <p:clrMapOvr>
+    <a:masterClrMapping/>
+  </p:clrMapOvr>
+</p:sld>
+</file>
+
+<file path=ppt/slides/slide5.xml><?xml version="1.0" encoding="utf-8"?>
+<p:sld xmlns:a="http://schemas.openxmlformats.org/drawingml/2006/main" xmlns:r="http://schemas.openxmlformats.org/officeDocument/2006/relationships" xmlns:p="http://schemas.openxmlformats.org/presentationml/2006/main">
+  <p:cSld>
+    <p:spTree>
+      <p:nvGrpSpPr>
+        <p:cNvPr id="1" name=""/>
+        <p:cNvGrpSpPr/>
+        <p:nvPr/>
+      </p:nvGrpSpPr>
+      <p:grpSpPr>
+        <a:xfrm>
+          <a:off x="0" y="0"/>
+          <a:ext cx="0" cy="0"/>
+          <a:chOff x="0" y="0"/>
+          <a:chExt cx="0" cy="0"/>
+        </a:xfrm>
+      </p:grpSpPr>
       <p:pic>
         <p:nvPicPr>
           <p:cNvPr id="5" name="Picture 4">
@@ -5913,7 +6542,7 @@
 </p:sld>
 </file>
 
-<file path=ppt/slides/slide5.xml><?xml version="1.0" encoding="utf-8"?>
+<file path=ppt/slides/slide6.xml><?xml version="1.0" encoding="utf-8"?>
 <p:sld xmlns:a="http://schemas.openxmlformats.org/drawingml/2006/main" xmlns:r="http://schemas.openxmlformats.org/officeDocument/2006/relationships" xmlns:p="http://schemas.openxmlformats.org/presentationml/2006/main">
   <p:cSld>
     <p:spTree>

</xml_diff>